<commit_message>
Aula 11 Server APACHE 20042023
</commit_message>
<xml_diff>
--- a/01 Classes/Aula 11 - Computação em Nuvem e Web Services em Linux e Web Apache.pptx
+++ b/01 Classes/Aula 11 - Computação em Nuvem e Web Services em Linux e Web Apache.pptx
@@ -5,17 +5,21 @@
     <p:sldMasterId id="2147483648" r:id="rId1"/>
   </p:sldMasterIdLst>
   <p:notesMasterIdLst>
-    <p:notesMasterId r:id="rId10"/>
+    <p:notesMasterId r:id="rId14"/>
   </p:notesMasterIdLst>
   <p:sldIdLst>
     <p:sldId id="256" r:id="rId2"/>
     <p:sldId id="291" r:id="rId3"/>
     <p:sldId id="409" r:id="rId4"/>
-    <p:sldId id="408" r:id="rId5"/>
-    <p:sldId id="323" r:id="rId6"/>
-    <p:sldId id="334" r:id="rId7"/>
-    <p:sldId id="337" r:id="rId8"/>
-    <p:sldId id="309" r:id="rId9"/>
+    <p:sldId id="411" r:id="rId5"/>
+    <p:sldId id="412" r:id="rId6"/>
+    <p:sldId id="413" r:id="rId7"/>
+    <p:sldId id="410" r:id="rId8"/>
+    <p:sldId id="408" r:id="rId9"/>
+    <p:sldId id="323" r:id="rId10"/>
+    <p:sldId id="334" r:id="rId11"/>
+    <p:sldId id="337" r:id="rId12"/>
+    <p:sldId id="309" r:id="rId13"/>
   </p:sldIdLst>
   <p:sldSz cx="9144000" cy="5143500" type="screen16x9"/>
   <p:notesSz cx="6858000" cy="9144000"/>
@@ -562,6 +566,72 @@
 </p:notes>
 </file>
 
+<file path=ppt/notesSlides/notesSlide10.xml><?xml version="1.0" encoding="utf-8"?>
+<p:notes xmlns:a="http://schemas.openxmlformats.org/drawingml/2006/main" xmlns:r="http://schemas.openxmlformats.org/officeDocument/2006/relationships" xmlns:p="http://schemas.openxmlformats.org/presentationml/2006/main">
+  <p:cSld>
+    <p:spTree>
+      <p:nvGrpSpPr>
+        <p:cNvPr id="1" name=""/>
+        <p:cNvGrpSpPr/>
+        <p:nvPr/>
+      </p:nvGrpSpPr>
+      <p:grpSpPr>
+        <a:xfrm>
+          <a:off x="0" y="0"/>
+          <a:ext cx="0" cy="0"/>
+          <a:chOff x="0" y="0"/>
+          <a:chExt cx="0" cy="0"/>
+        </a:xfrm>
+      </p:grpSpPr>
+      <p:sp>
+        <p:nvSpPr>
+          <p:cNvPr id="2" name="Espaço Reservado para Imagem de Slide 1"/>
+          <p:cNvSpPr>
+            <a:spLocks noGrp="1" noRot="1" noChangeAspect="1"/>
+          </p:cNvSpPr>
+          <p:nvPr>
+            <p:ph type="sldImg"/>
+          </p:nvPr>
+        </p:nvSpPr>
+        <p:spPr>
+          <a:xfrm>
+            <a:off x="381000" y="685800"/>
+            <a:ext cx="6096000" cy="3429000"/>
+          </a:xfrm>
+        </p:spPr>
+      </p:sp>
+      <p:sp>
+        <p:nvSpPr>
+          <p:cNvPr id="3" name="Espaço Reservado para Anotações 2"/>
+          <p:cNvSpPr>
+            <a:spLocks noGrp="1"/>
+          </p:cNvSpPr>
+          <p:nvPr>
+            <p:ph type="body" idx="1"/>
+          </p:nvPr>
+        </p:nvSpPr>
+        <p:spPr/>
+        <p:txBody>
+          <a:bodyPr/>
+          <a:lstStyle/>
+          <a:p>
+            <a:endParaRPr lang="pt-BR" dirty="0"/>
+          </a:p>
+        </p:txBody>
+      </p:sp>
+    </p:spTree>
+    <p:extLst>
+      <p:ext uri="{BB962C8B-B14F-4D97-AF65-F5344CB8AC3E}">
+        <p14:creationId xmlns:p14="http://schemas.microsoft.com/office/powerpoint/2010/main" val="4290351292"/>
+      </p:ext>
+    </p:extLst>
+  </p:cSld>
+  <p:clrMapOvr>
+    <a:masterClrMapping/>
+  </p:clrMapOvr>
+</p:notes>
+</file>
+
 <file path=ppt/notesSlides/notesSlide2.xml><?xml version="1.0" encoding="utf-8"?>
 <p:notes xmlns:a="http://schemas.openxmlformats.org/drawingml/2006/main" xmlns:r="http://schemas.openxmlformats.org/officeDocument/2006/relationships" xmlns:p="http://schemas.openxmlformats.org/presentationml/2006/main">
   <p:cSld>
@@ -684,7 +754,7 @@
     </p:spTree>
     <p:extLst>
       <p:ext uri="{BB962C8B-B14F-4D97-AF65-F5344CB8AC3E}">
-        <p14:creationId xmlns:p14="http://schemas.microsoft.com/office/powerpoint/2010/main" val="3886978698"/>
+        <p14:creationId xmlns:p14="http://schemas.microsoft.com/office/powerpoint/2010/main" val="3514543308"/>
       </p:ext>
     </p:extLst>
   </p:cSld>
@@ -750,7 +820,7 @@
     </p:spTree>
     <p:extLst>
       <p:ext uri="{BB962C8B-B14F-4D97-AF65-F5344CB8AC3E}">
-        <p14:creationId xmlns:p14="http://schemas.microsoft.com/office/powerpoint/2010/main" val="2709569597"/>
+        <p14:creationId xmlns:p14="http://schemas.microsoft.com/office/powerpoint/2010/main" val="1638421351"/>
       </p:ext>
     </p:extLst>
   </p:cSld>
@@ -816,7 +886,7 @@
     </p:spTree>
     <p:extLst>
       <p:ext uri="{BB962C8B-B14F-4D97-AF65-F5344CB8AC3E}">
-        <p14:creationId xmlns:p14="http://schemas.microsoft.com/office/powerpoint/2010/main" val="2296249050"/>
+        <p14:creationId xmlns:p14="http://schemas.microsoft.com/office/powerpoint/2010/main" val="3212655428"/>
       </p:ext>
     </p:extLst>
   </p:cSld>
@@ -882,7 +952,205 @@
     </p:spTree>
     <p:extLst>
       <p:ext uri="{BB962C8B-B14F-4D97-AF65-F5344CB8AC3E}">
-        <p14:creationId xmlns:p14="http://schemas.microsoft.com/office/powerpoint/2010/main" val="4290351292"/>
+        <p14:creationId xmlns:p14="http://schemas.microsoft.com/office/powerpoint/2010/main" val="3378269568"/>
+      </p:ext>
+    </p:extLst>
+  </p:cSld>
+  <p:clrMapOvr>
+    <a:masterClrMapping/>
+  </p:clrMapOvr>
+</p:notes>
+</file>
+
+<file path=ppt/notesSlides/notesSlide7.xml><?xml version="1.0" encoding="utf-8"?>
+<p:notes xmlns:a="http://schemas.openxmlformats.org/drawingml/2006/main" xmlns:r="http://schemas.openxmlformats.org/officeDocument/2006/relationships" xmlns:p="http://schemas.openxmlformats.org/presentationml/2006/main">
+  <p:cSld>
+    <p:spTree>
+      <p:nvGrpSpPr>
+        <p:cNvPr id="1" name=""/>
+        <p:cNvGrpSpPr/>
+        <p:nvPr/>
+      </p:nvGrpSpPr>
+      <p:grpSpPr>
+        <a:xfrm>
+          <a:off x="0" y="0"/>
+          <a:ext cx="0" cy="0"/>
+          <a:chOff x="0" y="0"/>
+          <a:chExt cx="0" cy="0"/>
+        </a:xfrm>
+      </p:grpSpPr>
+      <p:sp>
+        <p:nvSpPr>
+          <p:cNvPr id="2" name="Espaço Reservado para Imagem de Slide 1"/>
+          <p:cNvSpPr>
+            <a:spLocks noGrp="1" noRot="1" noChangeAspect="1"/>
+          </p:cNvSpPr>
+          <p:nvPr>
+            <p:ph type="sldImg"/>
+          </p:nvPr>
+        </p:nvSpPr>
+        <p:spPr>
+          <a:xfrm>
+            <a:off x="381000" y="685800"/>
+            <a:ext cx="6096000" cy="3429000"/>
+          </a:xfrm>
+        </p:spPr>
+      </p:sp>
+      <p:sp>
+        <p:nvSpPr>
+          <p:cNvPr id="3" name="Espaço Reservado para Anotações 2"/>
+          <p:cNvSpPr>
+            <a:spLocks noGrp="1"/>
+          </p:cNvSpPr>
+          <p:nvPr>
+            <p:ph type="body" idx="1"/>
+          </p:nvPr>
+        </p:nvSpPr>
+        <p:spPr/>
+        <p:txBody>
+          <a:bodyPr/>
+          <a:lstStyle/>
+          <a:p>
+            <a:endParaRPr lang="pt-BR" dirty="0"/>
+          </a:p>
+        </p:txBody>
+      </p:sp>
+    </p:spTree>
+    <p:extLst>
+      <p:ext uri="{BB962C8B-B14F-4D97-AF65-F5344CB8AC3E}">
+        <p14:creationId xmlns:p14="http://schemas.microsoft.com/office/powerpoint/2010/main" val="3886978698"/>
+      </p:ext>
+    </p:extLst>
+  </p:cSld>
+  <p:clrMapOvr>
+    <a:masterClrMapping/>
+  </p:clrMapOvr>
+</p:notes>
+</file>
+
+<file path=ppt/notesSlides/notesSlide8.xml><?xml version="1.0" encoding="utf-8"?>
+<p:notes xmlns:a="http://schemas.openxmlformats.org/drawingml/2006/main" xmlns:r="http://schemas.openxmlformats.org/officeDocument/2006/relationships" xmlns:p="http://schemas.openxmlformats.org/presentationml/2006/main">
+  <p:cSld>
+    <p:spTree>
+      <p:nvGrpSpPr>
+        <p:cNvPr id="1" name=""/>
+        <p:cNvGrpSpPr/>
+        <p:nvPr/>
+      </p:nvGrpSpPr>
+      <p:grpSpPr>
+        <a:xfrm>
+          <a:off x="0" y="0"/>
+          <a:ext cx="0" cy="0"/>
+          <a:chOff x="0" y="0"/>
+          <a:chExt cx="0" cy="0"/>
+        </a:xfrm>
+      </p:grpSpPr>
+      <p:sp>
+        <p:nvSpPr>
+          <p:cNvPr id="2" name="Espaço Reservado para Imagem de Slide 1"/>
+          <p:cNvSpPr>
+            <a:spLocks noGrp="1" noRot="1" noChangeAspect="1"/>
+          </p:cNvSpPr>
+          <p:nvPr>
+            <p:ph type="sldImg"/>
+          </p:nvPr>
+        </p:nvSpPr>
+        <p:spPr>
+          <a:xfrm>
+            <a:off x="381000" y="685800"/>
+            <a:ext cx="6096000" cy="3429000"/>
+          </a:xfrm>
+        </p:spPr>
+      </p:sp>
+      <p:sp>
+        <p:nvSpPr>
+          <p:cNvPr id="3" name="Espaço Reservado para Anotações 2"/>
+          <p:cNvSpPr>
+            <a:spLocks noGrp="1"/>
+          </p:cNvSpPr>
+          <p:nvPr>
+            <p:ph type="body" idx="1"/>
+          </p:nvPr>
+        </p:nvSpPr>
+        <p:spPr/>
+        <p:txBody>
+          <a:bodyPr/>
+          <a:lstStyle/>
+          <a:p>
+            <a:endParaRPr lang="pt-BR" dirty="0"/>
+          </a:p>
+        </p:txBody>
+      </p:sp>
+    </p:spTree>
+    <p:extLst>
+      <p:ext uri="{BB962C8B-B14F-4D97-AF65-F5344CB8AC3E}">
+        <p14:creationId xmlns:p14="http://schemas.microsoft.com/office/powerpoint/2010/main" val="2709569597"/>
+      </p:ext>
+    </p:extLst>
+  </p:cSld>
+  <p:clrMapOvr>
+    <a:masterClrMapping/>
+  </p:clrMapOvr>
+</p:notes>
+</file>
+
+<file path=ppt/notesSlides/notesSlide9.xml><?xml version="1.0" encoding="utf-8"?>
+<p:notes xmlns:a="http://schemas.openxmlformats.org/drawingml/2006/main" xmlns:r="http://schemas.openxmlformats.org/officeDocument/2006/relationships" xmlns:p="http://schemas.openxmlformats.org/presentationml/2006/main">
+  <p:cSld>
+    <p:spTree>
+      <p:nvGrpSpPr>
+        <p:cNvPr id="1" name=""/>
+        <p:cNvGrpSpPr/>
+        <p:nvPr/>
+      </p:nvGrpSpPr>
+      <p:grpSpPr>
+        <a:xfrm>
+          <a:off x="0" y="0"/>
+          <a:ext cx="0" cy="0"/>
+          <a:chOff x="0" y="0"/>
+          <a:chExt cx="0" cy="0"/>
+        </a:xfrm>
+      </p:grpSpPr>
+      <p:sp>
+        <p:nvSpPr>
+          <p:cNvPr id="2" name="Espaço Reservado para Imagem de Slide 1"/>
+          <p:cNvSpPr>
+            <a:spLocks noGrp="1" noRot="1" noChangeAspect="1"/>
+          </p:cNvSpPr>
+          <p:nvPr>
+            <p:ph type="sldImg"/>
+          </p:nvPr>
+        </p:nvSpPr>
+        <p:spPr>
+          <a:xfrm>
+            <a:off x="381000" y="685800"/>
+            <a:ext cx="6096000" cy="3429000"/>
+          </a:xfrm>
+        </p:spPr>
+      </p:sp>
+      <p:sp>
+        <p:nvSpPr>
+          <p:cNvPr id="3" name="Espaço Reservado para Anotações 2"/>
+          <p:cNvSpPr>
+            <a:spLocks noGrp="1"/>
+          </p:cNvSpPr>
+          <p:nvPr>
+            <p:ph type="body" idx="1"/>
+          </p:nvPr>
+        </p:nvSpPr>
+        <p:spPr/>
+        <p:txBody>
+          <a:bodyPr/>
+          <a:lstStyle/>
+          <a:p>
+            <a:endParaRPr lang="pt-BR" dirty="0"/>
+          </a:p>
+        </p:txBody>
+      </p:sp>
+    </p:spTree>
+    <p:extLst>
+      <p:ext uri="{BB962C8B-B14F-4D97-AF65-F5344CB8AC3E}">
+        <p14:creationId xmlns:p14="http://schemas.microsoft.com/office/powerpoint/2010/main" val="2296249050"/>
       </p:ext>
     </p:extLst>
   </p:cSld>
@@ -3844,6 +4112,915 @@
 </p:sld>
 </file>
 
+<file path=ppt/slides/slide10.xml><?xml version="1.0" encoding="utf-8"?>
+<p:sld xmlns:a="http://schemas.openxmlformats.org/drawingml/2006/main" xmlns:r="http://schemas.openxmlformats.org/officeDocument/2006/relationships" xmlns:p="http://schemas.openxmlformats.org/presentationml/2006/main">
+  <p:cSld>
+    <p:spTree>
+      <p:nvGrpSpPr>
+        <p:cNvPr id="1" name=""/>
+        <p:cNvGrpSpPr/>
+        <p:nvPr/>
+      </p:nvGrpSpPr>
+      <p:grpSpPr>
+        <a:xfrm>
+          <a:off x="0" y="0"/>
+          <a:ext cx="0" cy="0"/>
+          <a:chOff x="0" y="0"/>
+          <a:chExt cx="0" cy="0"/>
+        </a:xfrm>
+      </p:grpSpPr>
+      <p:sp>
+        <p:nvSpPr>
+          <p:cNvPr id="6" name="Title 1"/>
+          <p:cNvSpPr>
+            <a:spLocks noGrp="1"/>
+          </p:cNvSpPr>
+          <p:nvPr>
+            <p:ph type="title"/>
+          </p:nvPr>
+        </p:nvSpPr>
+        <p:spPr>
+          <a:xfrm>
+            <a:off x="457200" y="205980"/>
+            <a:ext cx="8229600" cy="857251"/>
+          </a:xfrm>
+        </p:spPr>
+        <p:txBody>
+          <a:bodyPr>
+            <a:normAutofit/>
+          </a:bodyPr>
+          <a:lstStyle/>
+          <a:p>
+            <a:r>
+              <a:rPr lang="en-US" b="1" dirty="0" err="1">
+                <a:solidFill>
+                  <a:srgbClr val="0070C0"/>
+                </a:solidFill>
+              </a:rPr>
+              <a:t>Dinâmica</a:t>
+            </a:r>
+            <a:r>
+              <a:rPr lang="en-US" b="1" dirty="0">
+                <a:solidFill>
+                  <a:srgbClr val="0070C0"/>
+                </a:solidFill>
+              </a:rPr>
+              <a:t>/</a:t>
+            </a:r>
+            <a:r>
+              <a:rPr lang="en-US" b="1" dirty="0" err="1">
+                <a:solidFill>
+                  <a:srgbClr val="0070C0"/>
+                </a:solidFill>
+              </a:rPr>
+              <a:t>Atividades</a:t>
+            </a:r>
+            <a:endParaRPr lang="en-US" b="1" dirty="0">
+              <a:solidFill>
+                <a:srgbClr val="0070C0"/>
+              </a:solidFill>
+            </a:endParaRPr>
+          </a:p>
+        </p:txBody>
+      </p:sp>
+      <p:sp>
+        <p:nvSpPr>
+          <p:cNvPr id="8" name="Text Placeholder 2"/>
+          <p:cNvSpPr>
+            <a:spLocks noGrp="1"/>
+          </p:cNvSpPr>
+          <p:nvPr>
+            <p:ph type="body" sz="half" idx="1"/>
+          </p:nvPr>
+        </p:nvSpPr>
+        <p:spPr>
+          <a:xfrm>
+            <a:off x="139472" y="1063230"/>
+            <a:ext cx="8865056" cy="3606305"/>
+          </a:xfrm>
+        </p:spPr>
+        <p:txBody>
+          <a:bodyPr>
+            <a:noAutofit/>
+          </a:bodyPr>
+          <a:lstStyle/>
+          <a:p>
+            <a:pPr marL="0" indent="0" algn="just">
+              <a:buNone/>
+            </a:pPr>
+            <a:endParaRPr lang="pt-BR" sz="2400" dirty="0">
+              <a:latin typeface="Times New Roman" panose="02020603050405020304" pitchFamily="18" charset="0"/>
+              <a:cs typeface="Times New Roman" panose="02020603050405020304" pitchFamily="18" charset="0"/>
+            </a:endParaRPr>
+          </a:p>
+          <a:p>
+            <a:pPr marL="0" indent="0" algn="just">
+              <a:buNone/>
+            </a:pPr>
+            <a:endParaRPr lang="pt-BR" sz="2400" dirty="0">
+              <a:latin typeface="Times New Roman" panose="02020603050405020304" pitchFamily="18" charset="0"/>
+              <a:cs typeface="Times New Roman" panose="02020603050405020304" pitchFamily="18" charset="0"/>
+            </a:endParaRPr>
+          </a:p>
+          <a:p>
+            <a:pPr marL="0" indent="0" algn="just">
+              <a:buNone/>
+            </a:pPr>
+            <a:endParaRPr lang="pt-BR" sz="2400" dirty="0">
+              <a:latin typeface="Times New Roman" panose="02020603050405020304" pitchFamily="18" charset="0"/>
+              <a:cs typeface="Times New Roman" panose="02020603050405020304" pitchFamily="18" charset="0"/>
+            </a:endParaRPr>
+          </a:p>
+          <a:p>
+            <a:pPr marL="0" indent="0" algn="just">
+              <a:buNone/>
+            </a:pPr>
+            <a:r>
+              <a:rPr lang="pt-BR" sz="2400" dirty="0">
+                <a:latin typeface="Times New Roman" panose="02020603050405020304" pitchFamily="18" charset="0"/>
+                <a:cs typeface="Times New Roman" panose="02020603050405020304" pitchFamily="18" charset="0"/>
+              </a:rPr>
+              <a:t>- </a:t>
+            </a:r>
+            <a:r>
+              <a:rPr lang="pt-BR" sz="2400" b="1" dirty="0">
+                <a:latin typeface="Times New Roman" panose="02020603050405020304" pitchFamily="18" charset="0"/>
+                <a:cs typeface="Times New Roman" panose="02020603050405020304" pitchFamily="18" charset="0"/>
+              </a:rPr>
+              <a:t>Rodar uma app Web no server Apache no SO Linux</a:t>
+            </a:r>
+            <a:endParaRPr lang="pt-BR" sz="2400" dirty="0">
+              <a:latin typeface="Calibri" panose="020F0502020204030204" pitchFamily="34" charset="0"/>
+            </a:endParaRPr>
+          </a:p>
+        </p:txBody>
+      </p:sp>
+    </p:spTree>
+    <p:extLst>
+      <p:ext uri="{BB962C8B-B14F-4D97-AF65-F5344CB8AC3E}">
+        <p14:creationId xmlns:p14="http://schemas.microsoft.com/office/powerpoint/2010/main" val="2470652989"/>
+      </p:ext>
+    </p:extLst>
+  </p:cSld>
+  <p:clrMapOvr>
+    <a:masterClrMapping/>
+  </p:clrMapOvr>
+  <p:transition spd="med"/>
+</p:sld>
+</file>
+
+<file path=ppt/slides/slide11.xml><?xml version="1.0" encoding="utf-8"?>
+<p:sld xmlns:a="http://schemas.openxmlformats.org/drawingml/2006/main" xmlns:r="http://schemas.openxmlformats.org/officeDocument/2006/relationships" xmlns:p="http://schemas.openxmlformats.org/presentationml/2006/main">
+  <p:cSld>
+    <p:spTree>
+      <p:nvGrpSpPr>
+        <p:cNvPr id="1" name=""/>
+        <p:cNvGrpSpPr/>
+        <p:nvPr/>
+      </p:nvGrpSpPr>
+      <p:grpSpPr>
+        <a:xfrm>
+          <a:off x="0" y="0"/>
+          <a:ext cx="0" cy="0"/>
+          <a:chOff x="0" y="0"/>
+          <a:chExt cx="0" cy="0"/>
+        </a:xfrm>
+      </p:grpSpPr>
+      <p:sp>
+        <p:nvSpPr>
+          <p:cNvPr id="6" name="Title 1"/>
+          <p:cNvSpPr>
+            <a:spLocks noGrp="1"/>
+          </p:cNvSpPr>
+          <p:nvPr>
+            <p:ph type="title"/>
+          </p:nvPr>
+        </p:nvSpPr>
+        <p:spPr>
+          <a:xfrm>
+            <a:off x="457200" y="205980"/>
+            <a:ext cx="8229600" cy="857251"/>
+          </a:xfrm>
+        </p:spPr>
+        <p:txBody>
+          <a:bodyPr>
+            <a:normAutofit/>
+          </a:bodyPr>
+          <a:lstStyle/>
+          <a:p>
+            <a:r>
+              <a:rPr lang="en-US" b="1" dirty="0" err="1">
+                <a:solidFill>
+                  <a:srgbClr val="0070C0"/>
+                </a:solidFill>
+              </a:rPr>
+              <a:t>Referências</a:t>
+            </a:r>
+            <a:r>
+              <a:rPr lang="en-US" b="1" dirty="0">
+                <a:solidFill>
+                  <a:srgbClr val="0070C0"/>
+                </a:solidFill>
+              </a:rPr>
+              <a:t> </a:t>
+            </a:r>
+            <a:r>
+              <a:rPr lang="en-US" b="1" dirty="0" err="1">
+                <a:solidFill>
+                  <a:srgbClr val="0070C0"/>
+                </a:solidFill>
+              </a:rPr>
+              <a:t>Bibliográficas</a:t>
+            </a:r>
+            <a:endParaRPr lang="en-US" b="1" dirty="0">
+              <a:solidFill>
+                <a:srgbClr val="0070C0"/>
+              </a:solidFill>
+            </a:endParaRPr>
+          </a:p>
+        </p:txBody>
+      </p:sp>
+      <p:sp>
+        <p:nvSpPr>
+          <p:cNvPr id="8" name="Text Placeholder 2"/>
+          <p:cNvSpPr>
+            <a:spLocks noGrp="1"/>
+          </p:cNvSpPr>
+          <p:nvPr>
+            <p:ph type="body" sz="half" idx="1"/>
+          </p:nvPr>
+        </p:nvSpPr>
+        <p:spPr>
+          <a:xfrm>
+            <a:off x="142865" y="1200151"/>
+            <a:ext cx="8865056" cy="3394472"/>
+          </a:xfrm>
+        </p:spPr>
+        <p:txBody>
+          <a:bodyPr>
+            <a:noAutofit/>
+          </a:bodyPr>
+          <a:lstStyle/>
+          <a:p>
+            <a:pPr marL="0" indent="0" algn="just">
+              <a:buNone/>
+            </a:pPr>
+            <a:r>
+              <a:rPr lang="pt-BR" sz="2000" dirty="0">
+                <a:solidFill>
+                  <a:schemeClr val="tx1"/>
+                </a:solidFill>
+                <a:latin typeface="Times New Roman" panose="02020603050405020304" pitchFamily="18" charset="0"/>
+                <a:cs typeface="Times New Roman" panose="02020603050405020304" pitchFamily="18" charset="0"/>
+              </a:rPr>
+              <a:t>[1] </a:t>
+            </a:r>
+            <a:r>
+              <a:rPr lang="en-US" sz="2000" b="1" dirty="0">
+                <a:solidFill>
+                  <a:srgbClr val="FF0000"/>
+                </a:solidFill>
+                <a:latin typeface="Times New Roman" panose="02020603050405020304" pitchFamily="18" charset="0"/>
+                <a:cs typeface="Times New Roman" panose="02020603050405020304" pitchFamily="18" charset="0"/>
+              </a:rPr>
+              <a:t>FIELDING, Roy T.. ; KAISER, Gail</a:t>
+            </a:r>
+            <a:r>
+              <a:rPr lang="en-US" sz="2000" dirty="0">
+                <a:solidFill>
+                  <a:schemeClr val="tx1"/>
+                </a:solidFill>
+                <a:latin typeface="Times New Roman" panose="02020603050405020304" pitchFamily="18" charset="0"/>
+                <a:cs typeface="Times New Roman" panose="02020603050405020304" pitchFamily="18" charset="0"/>
+              </a:rPr>
+              <a:t>. The Apache HTTP server project. IEEE Internet Computing, v. 1, n. 4, p. 88-90, 1997.</a:t>
+            </a:r>
+            <a:endParaRPr lang="pt-BR" sz="2000" dirty="0">
+              <a:solidFill>
+                <a:schemeClr val="tx1"/>
+              </a:solidFill>
+              <a:latin typeface="Times New Roman" panose="02020603050405020304" pitchFamily="18" charset="0"/>
+              <a:cs typeface="Times New Roman" panose="02020603050405020304" pitchFamily="18" charset="0"/>
+            </a:endParaRPr>
+          </a:p>
+          <a:p>
+            <a:pPr marL="0" indent="0" algn="just">
+              <a:buNone/>
+            </a:pPr>
+            <a:endParaRPr lang="pt-BR" sz="2000" dirty="0">
+              <a:solidFill>
+                <a:schemeClr val="tx1"/>
+              </a:solidFill>
+              <a:latin typeface="Times New Roman" panose="02020603050405020304" pitchFamily="18" charset="0"/>
+              <a:cs typeface="Times New Roman" panose="02020603050405020304" pitchFamily="18" charset="0"/>
+            </a:endParaRPr>
+          </a:p>
+          <a:p>
+            <a:pPr marL="0" indent="0" algn="just">
+              <a:buNone/>
+              <a:tabLst>
+                <a:tab pos="457200" algn="l"/>
+              </a:tabLst>
+            </a:pPr>
+            <a:r>
+              <a:rPr lang="pt-BR" sz="2000" dirty="0">
+                <a:solidFill>
+                  <a:schemeClr val="tx1"/>
+                </a:solidFill>
+                <a:latin typeface="Times New Roman" panose="02020603050405020304" pitchFamily="18" charset="0"/>
+                <a:cs typeface="Times New Roman" panose="02020603050405020304" pitchFamily="18" charset="0"/>
+              </a:rPr>
+              <a:t>[2] </a:t>
+            </a:r>
+            <a:r>
+              <a:rPr lang="it-IT" sz="2000" b="1" dirty="0">
+                <a:solidFill>
+                  <a:srgbClr val="FF0000"/>
+                </a:solidFill>
+                <a:latin typeface="Times New Roman" panose="02020603050405020304" pitchFamily="18" charset="0"/>
+                <a:cs typeface="Times New Roman" panose="02020603050405020304" pitchFamily="18" charset="0"/>
+              </a:rPr>
+              <a:t>LAURIE, Ben; LAURIE, Peter</a:t>
+            </a:r>
+            <a:r>
+              <a:rPr lang="it-IT" sz="2000" dirty="0">
+                <a:solidFill>
+                  <a:schemeClr val="tx1"/>
+                </a:solidFill>
+                <a:latin typeface="Times New Roman" panose="02020603050405020304" pitchFamily="18" charset="0"/>
+                <a:cs typeface="Times New Roman" panose="02020603050405020304" pitchFamily="18" charset="0"/>
+              </a:rPr>
+              <a:t>. Apache: The definitive guide. " O'Reilly Media, Inc.", 2003.</a:t>
+            </a:r>
+            <a:endParaRPr lang="pt-BR" sz="2000" dirty="0">
+              <a:solidFill>
+                <a:schemeClr val="tx1"/>
+              </a:solidFill>
+              <a:latin typeface="Times New Roman" panose="02020603050405020304" pitchFamily="18" charset="0"/>
+              <a:cs typeface="Times New Roman" panose="02020603050405020304" pitchFamily="18" charset="0"/>
+            </a:endParaRPr>
+          </a:p>
+          <a:p>
+            <a:pPr marL="0" indent="0" algn="just">
+              <a:buNone/>
+              <a:tabLst>
+                <a:tab pos="457200" algn="l"/>
+              </a:tabLst>
+            </a:pPr>
+            <a:endParaRPr lang="pt-BR" sz="2000" dirty="0">
+              <a:solidFill>
+                <a:schemeClr val="tx1"/>
+              </a:solidFill>
+              <a:latin typeface="Times New Roman" panose="02020603050405020304" pitchFamily="18" charset="0"/>
+              <a:cs typeface="Times New Roman" panose="02020603050405020304" pitchFamily="18" charset="0"/>
+            </a:endParaRPr>
+          </a:p>
+          <a:p>
+            <a:pPr marL="0" indent="0" algn="just">
+              <a:buNone/>
+              <a:tabLst>
+                <a:tab pos="457200" algn="l"/>
+              </a:tabLst>
+            </a:pPr>
+            <a:r>
+              <a:rPr lang="pt-BR" sz="2000" dirty="0">
+                <a:solidFill>
+                  <a:schemeClr val="tx1"/>
+                </a:solidFill>
+                <a:latin typeface="Times New Roman" panose="02020603050405020304" pitchFamily="18" charset="0"/>
+                <a:cs typeface="Times New Roman" panose="02020603050405020304" pitchFamily="18" charset="0"/>
+              </a:rPr>
+              <a:t>[3] </a:t>
+            </a:r>
+            <a:r>
+              <a:rPr lang="en-US" sz="2000" b="1" dirty="0">
+                <a:solidFill>
+                  <a:srgbClr val="FF0000"/>
+                </a:solidFill>
+                <a:latin typeface="Times New Roman" panose="02020603050405020304" pitchFamily="18" charset="0"/>
+                <a:cs typeface="Times New Roman" panose="02020603050405020304" pitchFamily="18" charset="0"/>
+              </a:rPr>
+              <a:t>KABIR, Mohammed J</a:t>
+            </a:r>
+            <a:r>
+              <a:rPr lang="en-US" sz="2000" dirty="0">
+                <a:solidFill>
+                  <a:schemeClr val="tx1"/>
+                </a:solidFill>
+                <a:latin typeface="Times New Roman" panose="02020603050405020304" pitchFamily="18" charset="0"/>
+                <a:cs typeface="Times New Roman" panose="02020603050405020304" pitchFamily="18" charset="0"/>
+              </a:rPr>
+              <a:t>. Apache Server Bible. IDG Books Worldwide, Inc., 1998.</a:t>
+            </a:r>
+            <a:endParaRPr lang="pt-BR" sz="2000" dirty="0">
+              <a:solidFill>
+                <a:schemeClr val="tx1"/>
+              </a:solidFill>
+              <a:latin typeface="Times New Roman" panose="02020603050405020304" pitchFamily="18" charset="0"/>
+              <a:cs typeface="Times New Roman" panose="02020603050405020304" pitchFamily="18" charset="0"/>
+            </a:endParaRPr>
+          </a:p>
+          <a:p>
+            <a:pPr marL="0" indent="0" algn="just">
+              <a:buNone/>
+              <a:tabLst>
+                <a:tab pos="457200" algn="l"/>
+              </a:tabLst>
+            </a:pPr>
+            <a:endParaRPr lang="pt-BR" sz="2000" dirty="0">
+              <a:solidFill>
+                <a:schemeClr val="tx1"/>
+              </a:solidFill>
+              <a:latin typeface="Times New Roman" panose="02020603050405020304" pitchFamily="18" charset="0"/>
+              <a:cs typeface="Times New Roman" panose="02020603050405020304" pitchFamily="18" charset="0"/>
+            </a:endParaRPr>
+          </a:p>
+        </p:txBody>
+      </p:sp>
+    </p:spTree>
+    <p:extLst>
+      <p:ext uri="{BB962C8B-B14F-4D97-AF65-F5344CB8AC3E}">
+        <p14:creationId xmlns:p14="http://schemas.microsoft.com/office/powerpoint/2010/main" val="1115311843"/>
+      </p:ext>
+    </p:extLst>
+  </p:cSld>
+  <p:clrMapOvr>
+    <a:masterClrMapping/>
+  </p:clrMapOvr>
+  <p:transition spd="med"/>
+</p:sld>
+</file>
+
+<file path=ppt/slides/slide12.xml><?xml version="1.0" encoding="utf-8"?>
+<p:sld xmlns:a="http://schemas.openxmlformats.org/drawingml/2006/main" xmlns:r="http://schemas.openxmlformats.org/officeDocument/2006/relationships" xmlns:p="http://schemas.openxmlformats.org/presentationml/2006/main">
+  <p:cSld>
+    <p:spTree>
+      <p:nvGrpSpPr>
+        <p:cNvPr id="1" name=""/>
+        <p:cNvGrpSpPr/>
+        <p:nvPr/>
+      </p:nvGrpSpPr>
+      <p:grpSpPr>
+        <a:xfrm>
+          <a:off x="0" y="0"/>
+          <a:ext cx="0" cy="0"/>
+          <a:chOff x="0" y="0"/>
+          <a:chExt cx="0" cy="0"/>
+        </a:xfrm>
+      </p:grpSpPr>
+      <p:pic>
+        <p:nvPicPr>
+          <p:cNvPr id="112" name="Picture 6" descr="Picture 6"/>
+          <p:cNvPicPr>
+            <a:picLocks noChangeAspect="1"/>
+          </p:cNvPicPr>
+          <p:nvPr/>
+        </p:nvPicPr>
+        <p:blipFill>
+          <a:blip r:embed="rId2"/>
+          <a:stretch>
+            <a:fillRect/>
+          </a:stretch>
+        </p:blipFill>
+        <p:spPr>
+          <a:xfrm>
+            <a:off x="0" y="0"/>
+            <a:ext cx="9144000" cy="5143500"/>
+          </a:xfrm>
+          <a:prstGeom prst="rect">
+            <a:avLst/>
+          </a:prstGeom>
+          <a:ln w="12700">
+            <a:miter lim="400000"/>
+            <a:headEnd/>
+            <a:tailEnd/>
+          </a:ln>
+        </p:spPr>
+      </p:pic>
+      <p:pic>
+        <p:nvPicPr>
+          <p:cNvPr id="114" name="Picture 5" descr="Picture 5"/>
+          <p:cNvPicPr>
+            <a:picLocks noChangeAspect="1"/>
+          </p:cNvPicPr>
+          <p:nvPr/>
+        </p:nvPicPr>
+        <p:blipFill>
+          <a:blip r:embed="rId3"/>
+          <a:stretch>
+            <a:fillRect/>
+          </a:stretch>
+        </p:blipFill>
+        <p:spPr>
+          <a:xfrm>
+            <a:off x="469900" y="0"/>
+            <a:ext cx="4391984" cy="171450"/>
+          </a:xfrm>
+          <a:prstGeom prst="rect">
+            <a:avLst/>
+          </a:prstGeom>
+          <a:ln w="12700">
+            <a:miter lim="400000"/>
+            <a:headEnd/>
+            <a:tailEnd/>
+          </a:ln>
+        </p:spPr>
+      </p:pic>
+      <p:sp>
+        <p:nvSpPr>
+          <p:cNvPr id="3" name="Título 2"/>
+          <p:cNvSpPr>
+            <a:spLocks noGrp="1"/>
+          </p:cNvSpPr>
+          <p:nvPr>
+            <p:ph type="title"/>
+          </p:nvPr>
+        </p:nvSpPr>
+        <p:spPr>
+          <a:xfrm>
+            <a:off x="285751" y="2386770"/>
+            <a:ext cx="8615364" cy="1102519"/>
+          </a:xfrm>
+        </p:spPr>
+        <p:txBody>
+          <a:bodyPr>
+            <a:noAutofit/>
+          </a:bodyPr>
+          <a:lstStyle/>
+          <a:p>
+            <a:r>
+              <a:rPr lang="pt-BR" sz="4800" b="1" dirty="0">
+                <a:solidFill>
+                  <a:schemeClr val="bg1"/>
+                </a:solidFill>
+              </a:rPr>
+              <a:t>Cloud Computer e </a:t>
+            </a:r>
+            <a:br>
+              <a:rPr lang="pt-BR" sz="4800" b="1" dirty="0">
+                <a:solidFill>
+                  <a:schemeClr val="bg1"/>
+                </a:solidFill>
+              </a:rPr>
+            </a:br>
+            <a:r>
+              <a:rPr lang="pt-BR" sz="4800" b="1" dirty="0">
+                <a:solidFill>
+                  <a:schemeClr val="bg1"/>
+                </a:solidFill>
+              </a:rPr>
+              <a:t>Web Services em Linux</a:t>
+            </a:r>
+          </a:p>
+        </p:txBody>
+      </p:sp>
+      <p:sp>
+        <p:nvSpPr>
+          <p:cNvPr id="6" name="Título 2"/>
+          <p:cNvSpPr txBox="1"/>
+          <p:nvPr/>
+        </p:nvSpPr>
+        <p:spPr>
+          <a:xfrm>
+            <a:off x="975683" y="3866663"/>
+            <a:ext cx="7772400" cy="1102519"/>
+          </a:xfrm>
+          <a:prstGeom prst="rect">
+            <a:avLst/>
+          </a:prstGeom>
+          <a:ln w="12700">
+            <a:miter lim="400000"/>
+          </a:ln>
+        </p:spPr>
+        <p:txBody>
+          <a:bodyPr lIns="45718" tIns="45718" rIns="45718" bIns="45718" anchor="ctr">
+            <a:noAutofit/>
+          </a:bodyPr>
+          <a:lstStyle>
+            <a:lvl1pPr marL="0" marR="0" indent="0" algn="ctr" defTabSz="457200" rtl="0" latinLnBrk="0">
+              <a:lnSpc>
+                <a:spcPct val="100000"/>
+              </a:lnSpc>
+              <a:spcBef>
+                <a:spcPts val="0"/>
+              </a:spcBef>
+              <a:spcAft>
+                <a:spcPts val="0"/>
+              </a:spcAft>
+              <a:buClrTx/>
+              <a:buSzTx/>
+              <a:buFontTx/>
+              <a:buNone/>
+              <a:defRPr sz="4400" b="0" i="0" u="none" strike="noStrike" cap="none" spc="0" baseline="0">
+                <a:ln>
+                  <a:noFill/>
+                </a:ln>
+                <a:solidFill>
+                  <a:srgbClr val="000000"/>
+                </a:solidFill>
+                <a:uFillTx/>
+                <a:latin typeface="+mj-lt"/>
+                <a:ea typeface="+mj-ea"/>
+                <a:cs typeface="+mj-cs"/>
+                <a:sym typeface="Calibri"/>
+              </a:defRPr>
+            </a:lvl1pPr>
+            <a:lvl2pPr marL="0" marR="0" indent="0" algn="ctr" defTabSz="457200" rtl="0" latinLnBrk="0">
+              <a:lnSpc>
+                <a:spcPct val="100000"/>
+              </a:lnSpc>
+              <a:spcBef>
+                <a:spcPts val="0"/>
+              </a:spcBef>
+              <a:spcAft>
+                <a:spcPts val="0"/>
+              </a:spcAft>
+              <a:buClrTx/>
+              <a:buSzTx/>
+              <a:buFontTx/>
+              <a:buNone/>
+              <a:defRPr sz="4400" b="0" i="0" u="none" strike="noStrike" cap="none" spc="0" baseline="0">
+                <a:ln>
+                  <a:noFill/>
+                </a:ln>
+                <a:solidFill>
+                  <a:srgbClr val="000000"/>
+                </a:solidFill>
+                <a:uFillTx/>
+                <a:latin typeface="+mj-lt"/>
+                <a:ea typeface="+mj-ea"/>
+                <a:cs typeface="+mj-cs"/>
+                <a:sym typeface="Calibri"/>
+              </a:defRPr>
+            </a:lvl2pPr>
+            <a:lvl3pPr marL="0" marR="0" indent="0" algn="ctr" defTabSz="457200" rtl="0" latinLnBrk="0">
+              <a:lnSpc>
+                <a:spcPct val="100000"/>
+              </a:lnSpc>
+              <a:spcBef>
+                <a:spcPts val="0"/>
+              </a:spcBef>
+              <a:spcAft>
+                <a:spcPts val="0"/>
+              </a:spcAft>
+              <a:buClrTx/>
+              <a:buSzTx/>
+              <a:buFontTx/>
+              <a:buNone/>
+              <a:defRPr sz="4400" b="0" i="0" u="none" strike="noStrike" cap="none" spc="0" baseline="0">
+                <a:ln>
+                  <a:noFill/>
+                </a:ln>
+                <a:solidFill>
+                  <a:srgbClr val="000000"/>
+                </a:solidFill>
+                <a:uFillTx/>
+                <a:latin typeface="+mj-lt"/>
+                <a:ea typeface="+mj-ea"/>
+                <a:cs typeface="+mj-cs"/>
+                <a:sym typeface="Calibri"/>
+              </a:defRPr>
+            </a:lvl3pPr>
+            <a:lvl4pPr marL="0" marR="0" indent="0" algn="ctr" defTabSz="457200" rtl="0" latinLnBrk="0">
+              <a:lnSpc>
+                <a:spcPct val="100000"/>
+              </a:lnSpc>
+              <a:spcBef>
+                <a:spcPts val="0"/>
+              </a:spcBef>
+              <a:spcAft>
+                <a:spcPts val="0"/>
+              </a:spcAft>
+              <a:buClrTx/>
+              <a:buSzTx/>
+              <a:buFontTx/>
+              <a:buNone/>
+              <a:defRPr sz="4400" b="0" i="0" u="none" strike="noStrike" cap="none" spc="0" baseline="0">
+                <a:ln>
+                  <a:noFill/>
+                </a:ln>
+                <a:solidFill>
+                  <a:srgbClr val="000000"/>
+                </a:solidFill>
+                <a:uFillTx/>
+                <a:latin typeface="+mj-lt"/>
+                <a:ea typeface="+mj-ea"/>
+                <a:cs typeface="+mj-cs"/>
+                <a:sym typeface="Calibri"/>
+              </a:defRPr>
+            </a:lvl4pPr>
+            <a:lvl5pPr marL="0" marR="0" indent="0" algn="ctr" defTabSz="457200" rtl="0" latinLnBrk="0">
+              <a:lnSpc>
+                <a:spcPct val="100000"/>
+              </a:lnSpc>
+              <a:spcBef>
+                <a:spcPts val="0"/>
+              </a:spcBef>
+              <a:spcAft>
+                <a:spcPts val="0"/>
+              </a:spcAft>
+              <a:buClrTx/>
+              <a:buSzTx/>
+              <a:buFontTx/>
+              <a:buNone/>
+              <a:defRPr sz="4400" b="0" i="0" u="none" strike="noStrike" cap="none" spc="0" baseline="0">
+                <a:ln>
+                  <a:noFill/>
+                </a:ln>
+                <a:solidFill>
+                  <a:srgbClr val="000000"/>
+                </a:solidFill>
+                <a:uFillTx/>
+                <a:latin typeface="+mj-lt"/>
+                <a:ea typeface="+mj-ea"/>
+                <a:cs typeface="+mj-cs"/>
+                <a:sym typeface="Calibri"/>
+              </a:defRPr>
+            </a:lvl5pPr>
+            <a:lvl6pPr marL="0" marR="0" indent="0" algn="ctr" defTabSz="457200" rtl="0" latinLnBrk="0">
+              <a:lnSpc>
+                <a:spcPct val="100000"/>
+              </a:lnSpc>
+              <a:spcBef>
+                <a:spcPts val="0"/>
+              </a:spcBef>
+              <a:spcAft>
+                <a:spcPts val="0"/>
+              </a:spcAft>
+              <a:buClrTx/>
+              <a:buSzTx/>
+              <a:buFontTx/>
+              <a:buNone/>
+              <a:defRPr sz="4400" b="0" i="0" u="none" strike="noStrike" cap="none" spc="0" baseline="0">
+                <a:ln>
+                  <a:noFill/>
+                </a:ln>
+                <a:solidFill>
+                  <a:srgbClr val="000000"/>
+                </a:solidFill>
+                <a:uFillTx/>
+                <a:latin typeface="+mj-lt"/>
+                <a:ea typeface="+mj-ea"/>
+                <a:cs typeface="+mj-cs"/>
+                <a:sym typeface="Calibri"/>
+              </a:defRPr>
+            </a:lvl6pPr>
+            <a:lvl7pPr marL="0" marR="0" indent="0" algn="ctr" defTabSz="457200" rtl="0" latinLnBrk="0">
+              <a:lnSpc>
+                <a:spcPct val="100000"/>
+              </a:lnSpc>
+              <a:spcBef>
+                <a:spcPts val="0"/>
+              </a:spcBef>
+              <a:spcAft>
+                <a:spcPts val="0"/>
+              </a:spcAft>
+              <a:buClrTx/>
+              <a:buSzTx/>
+              <a:buFontTx/>
+              <a:buNone/>
+              <a:defRPr sz="4400" b="0" i="0" u="none" strike="noStrike" cap="none" spc="0" baseline="0">
+                <a:ln>
+                  <a:noFill/>
+                </a:ln>
+                <a:solidFill>
+                  <a:srgbClr val="000000"/>
+                </a:solidFill>
+                <a:uFillTx/>
+                <a:latin typeface="+mj-lt"/>
+                <a:ea typeface="+mj-ea"/>
+                <a:cs typeface="+mj-cs"/>
+                <a:sym typeface="Calibri"/>
+              </a:defRPr>
+            </a:lvl7pPr>
+            <a:lvl8pPr marL="0" marR="0" indent="0" algn="ctr" defTabSz="457200" rtl="0" latinLnBrk="0">
+              <a:lnSpc>
+                <a:spcPct val="100000"/>
+              </a:lnSpc>
+              <a:spcBef>
+                <a:spcPts val="0"/>
+              </a:spcBef>
+              <a:spcAft>
+                <a:spcPts val="0"/>
+              </a:spcAft>
+              <a:buClrTx/>
+              <a:buSzTx/>
+              <a:buFontTx/>
+              <a:buNone/>
+              <a:defRPr sz="4400" b="0" i="0" u="none" strike="noStrike" cap="none" spc="0" baseline="0">
+                <a:ln>
+                  <a:noFill/>
+                </a:ln>
+                <a:solidFill>
+                  <a:srgbClr val="000000"/>
+                </a:solidFill>
+                <a:uFillTx/>
+                <a:latin typeface="+mj-lt"/>
+                <a:ea typeface="+mj-ea"/>
+                <a:cs typeface="+mj-cs"/>
+                <a:sym typeface="Calibri"/>
+              </a:defRPr>
+            </a:lvl8pPr>
+            <a:lvl9pPr marL="0" marR="0" indent="0" algn="ctr" defTabSz="457200" rtl="0" latinLnBrk="0">
+              <a:lnSpc>
+                <a:spcPct val="100000"/>
+              </a:lnSpc>
+              <a:spcBef>
+                <a:spcPts val="0"/>
+              </a:spcBef>
+              <a:spcAft>
+                <a:spcPts val="0"/>
+              </a:spcAft>
+              <a:buClrTx/>
+              <a:buSzTx/>
+              <a:buFontTx/>
+              <a:buNone/>
+              <a:defRPr sz="4400" b="0" i="0" u="none" strike="noStrike" cap="none" spc="0" baseline="0">
+                <a:ln>
+                  <a:noFill/>
+                </a:ln>
+                <a:solidFill>
+                  <a:srgbClr val="000000"/>
+                </a:solidFill>
+                <a:uFillTx/>
+                <a:latin typeface="+mj-lt"/>
+                <a:ea typeface="+mj-ea"/>
+                <a:cs typeface="+mj-cs"/>
+                <a:sym typeface="Calibri"/>
+              </a:defRPr>
+            </a:lvl9pPr>
+          </a:lstStyle>
+          <a:p>
+            <a:pPr algn="r" hangingPunct="1"/>
+            <a:r>
+              <a:rPr lang="pt-BR" sz="2000" b="1" dirty="0">
+                <a:solidFill>
+                  <a:schemeClr val="bg1"/>
+                </a:solidFill>
+              </a:rPr>
+              <a:t>Professor </a:t>
+            </a:r>
+            <a:r>
+              <a:rPr lang="pt-BR" sz="2000" b="1">
+                <a:solidFill>
+                  <a:schemeClr val="bg1"/>
+                </a:solidFill>
+              </a:rPr>
+              <a:t>M.Sc</a:t>
+            </a:r>
+            <a:r>
+              <a:rPr lang="pt-BR" sz="2000" b="1" dirty="0">
+                <a:solidFill>
+                  <a:schemeClr val="bg1"/>
+                </a:solidFill>
+              </a:rPr>
+              <a:t>. Heleno Cardoso</a:t>
+            </a:r>
+          </a:p>
+        </p:txBody>
+      </p:sp>
+      <p:pic>
+        <p:nvPicPr>
+          <p:cNvPr id="2" name="Google Shape;62;p1" descr="Imagem">
+            <a:extLst>
+              <a:ext uri="{FF2B5EF4-FFF2-40B4-BE49-F238E27FC236}">
+                <a16:creationId xmlns:a16="http://schemas.microsoft.com/office/drawing/2014/main" id="{9C895622-2963-024D-634E-EA58F5381D06}"/>
+              </a:ext>
+            </a:extLst>
+          </p:cNvPr>
+          <p:cNvPicPr preferRelativeResize="0"/>
+          <p:nvPr/>
+        </p:nvPicPr>
+        <p:blipFill rotWithShape="1">
+          <a:blip r:embed="rId4">
+            <a:alphaModFix/>
+          </a:blip>
+          <a:srcRect/>
+          <a:stretch/>
+        </p:blipFill>
+        <p:spPr>
+          <a:xfrm>
+            <a:off x="469898" y="343798"/>
+            <a:ext cx="2858518" cy="1338697"/>
+          </a:xfrm>
+          <a:prstGeom prst="rect">
+            <a:avLst/>
+          </a:prstGeom>
+          <a:noFill/>
+          <a:ln>
+            <a:noFill/>
+          </a:ln>
+        </p:spPr>
+      </p:pic>
+    </p:spTree>
+  </p:cSld>
+  <p:clrMapOvr>
+    <a:masterClrMapping/>
+  </p:clrMapOvr>
+  <p:transition spd="med"/>
+</p:sld>
+</file>
+
 <file path=ppt/slides/slide2.xml><?xml version="1.0" encoding="utf-8"?>
 <p:sld xmlns:a="http://schemas.openxmlformats.org/drawingml/2006/main" xmlns:r="http://schemas.openxmlformats.org/officeDocument/2006/relationships" xmlns:p="http://schemas.openxmlformats.org/presentationml/2006/main">
   <p:cSld>
@@ -4391,7 +5568,7 @@
                   <a:srgbClr val="0070C0"/>
                 </a:solidFill>
               </a:rPr>
-              <a:t>Web Apache</a:t>
+              <a:t>Server Apache</a:t>
             </a:r>
           </a:p>
         </p:txBody>
@@ -4421,16 +5598,13 @@
             <a:pPr marL="0" indent="0" algn="just">
               <a:buNone/>
             </a:pPr>
-            <a:r>
-              <a:rPr lang="pt-BR" sz="2400" dirty="0">
-                <a:solidFill>
-                  <a:schemeClr val="tx1"/>
-                </a:solidFill>
-                <a:latin typeface="Times" panose="02020603050405020304" pitchFamily="18" charset="0"/>
-                <a:cs typeface="Times" panose="02020603050405020304" pitchFamily="18" charset="0"/>
-              </a:rPr>
-              <a:t>...</a:t>
-            </a:r>
+            <a:endParaRPr lang="pt-BR" sz="2400" dirty="0">
+              <a:solidFill>
+                <a:schemeClr val="tx1"/>
+              </a:solidFill>
+              <a:latin typeface="Times" panose="02020603050405020304" pitchFamily="18" charset="0"/>
+              <a:cs typeface="Times" panose="02020603050405020304" pitchFamily="18" charset="0"/>
+            </a:endParaRPr>
           </a:p>
           <a:p>
             <a:pPr marL="0" indent="0" algn="just">
@@ -4448,6 +5622,76 @@
             <a:pPr marL="0" indent="0" algn="just">
               <a:buNone/>
             </a:pPr>
+            <a:r>
+              <a:rPr lang="pt-BR" sz="2400" dirty="0">
+                <a:solidFill>
+                  <a:schemeClr val="tx1"/>
+                </a:solidFill>
+                <a:latin typeface="Times" panose="02020603050405020304" pitchFamily="18" charset="0"/>
+                <a:cs typeface="Times" panose="02020603050405020304" pitchFamily="18" charset="0"/>
+              </a:rPr>
+              <a:t>O Servidor HTTP Apache ou Servidor Apache ou HTTP </a:t>
+            </a:r>
+            <a:r>
+              <a:rPr lang="pt-BR" sz="2400" dirty="0" err="1">
+                <a:solidFill>
+                  <a:schemeClr val="tx1"/>
+                </a:solidFill>
+                <a:latin typeface="Times" panose="02020603050405020304" pitchFamily="18" charset="0"/>
+                <a:cs typeface="Times" panose="02020603050405020304" pitchFamily="18" charset="0"/>
+              </a:rPr>
+              <a:t>Daemon</a:t>
+            </a:r>
+            <a:r>
+              <a:rPr lang="pt-BR" sz="2400" dirty="0">
+                <a:solidFill>
+                  <a:schemeClr val="tx1"/>
+                </a:solidFill>
+                <a:latin typeface="Times" panose="02020603050405020304" pitchFamily="18" charset="0"/>
+                <a:cs typeface="Times" panose="02020603050405020304" pitchFamily="18" charset="0"/>
+              </a:rPr>
+              <a:t> Apache ou somente Apache, é o servidor web livre criado em 1995 por um grupo de desenvolvedores da NCSA, tendo como base o servidor web NCSA </a:t>
+            </a:r>
+            <a:r>
+              <a:rPr lang="pt-BR" sz="2400" dirty="0" err="1">
+                <a:solidFill>
+                  <a:schemeClr val="tx1"/>
+                </a:solidFill>
+                <a:latin typeface="Times" panose="02020603050405020304" pitchFamily="18" charset="0"/>
+                <a:cs typeface="Times" panose="02020603050405020304" pitchFamily="18" charset="0"/>
+              </a:rPr>
+              <a:t>HTTPd</a:t>
+            </a:r>
+            <a:r>
+              <a:rPr lang="pt-BR" sz="2400" dirty="0">
+                <a:solidFill>
+                  <a:schemeClr val="tx1"/>
+                </a:solidFill>
+                <a:latin typeface="Times" panose="02020603050405020304" pitchFamily="18" charset="0"/>
+                <a:cs typeface="Times" panose="02020603050405020304" pitchFamily="18" charset="0"/>
+              </a:rPr>
+              <a:t> criado por Rob </a:t>
+            </a:r>
+            <a:r>
+              <a:rPr lang="pt-BR" sz="2400" dirty="0" err="1">
+                <a:solidFill>
+                  <a:schemeClr val="tx1"/>
+                </a:solidFill>
+                <a:latin typeface="Times" panose="02020603050405020304" pitchFamily="18" charset="0"/>
+                <a:cs typeface="Times" panose="02020603050405020304" pitchFamily="18" charset="0"/>
+              </a:rPr>
+              <a:t>McCool</a:t>
+            </a:r>
+            <a:r>
+              <a:rPr lang="pt-BR" sz="2400" dirty="0">
+                <a:solidFill>
+                  <a:schemeClr val="tx1"/>
+                </a:solidFill>
+                <a:latin typeface="Times" panose="02020603050405020304" pitchFamily="18" charset="0"/>
+                <a:cs typeface="Times" panose="02020603050405020304" pitchFamily="18" charset="0"/>
+              </a:rPr>
+              <a:t>.</a:t>
+            </a:r>
             <a:endParaRPr lang="pt-BR" sz="1800" b="1" dirty="0">
               <a:solidFill>
                 <a:srgbClr val="FF0000"/>
@@ -4512,34 +5756,13 @@
           <a:lstStyle/>
           <a:p>
             <a:r>
-              <a:rPr lang="en-US" b="1" dirty="0" err="1">
+              <a:rPr lang="en-US" b="1" dirty="0">
                 <a:solidFill>
                   <a:srgbClr val="0070C0"/>
                 </a:solidFill>
               </a:rPr>
-              <a:t>Leitura</a:t>
-            </a:r>
-            <a:r>
-              <a:rPr lang="en-US" b="1" dirty="0">
-                <a:solidFill>
-                  <a:srgbClr val="0070C0"/>
-                </a:solidFill>
-              </a:rPr>
-              <a:t> </a:t>
-            </a:r>
-            <a:r>
-              <a:rPr lang="en-US" b="1" dirty="0" err="1">
-                <a:solidFill>
-                  <a:srgbClr val="0070C0"/>
-                </a:solidFill>
-              </a:rPr>
-              <a:t>Específica</a:t>
-            </a:r>
-            <a:endParaRPr lang="en-US" b="1" dirty="0">
-              <a:solidFill>
-                <a:srgbClr val="0070C0"/>
-              </a:solidFill>
-            </a:endParaRPr>
+              <a:t>Server Apache Tomcat</a:t>
+            </a:r>
           </a:p>
         </p:txBody>
       </p:sp>
@@ -4555,8 +5778,8 @@
         </p:nvSpPr>
         <p:spPr>
           <a:xfrm>
-            <a:off x="142865" y="1200151"/>
-            <a:ext cx="8865056" cy="3394472"/>
+            <a:off x="142865" y="1200150"/>
+            <a:ext cx="8865056" cy="3847338"/>
           </a:xfrm>
         </p:spPr>
         <p:txBody>
@@ -4569,62 +5792,233 @@
               <a:buNone/>
             </a:pPr>
             <a:r>
-              <a:rPr lang="pt-BR" sz="2000" dirty="0">
-                <a:latin typeface="Times New Roman" panose="02020603050405020304" pitchFamily="18" charset="0"/>
-                <a:cs typeface="Times New Roman" panose="02020603050405020304" pitchFamily="18" charset="0"/>
-              </a:rPr>
-              <a:t>[1] ...</a:t>
+              <a:rPr lang="pt-BR" sz="2400" dirty="0">
+                <a:solidFill>
+                  <a:schemeClr val="tx1"/>
+                </a:solidFill>
+                <a:latin typeface="Times" panose="02020603050405020304" pitchFamily="18" charset="0"/>
+                <a:cs typeface="Times" panose="02020603050405020304" pitchFamily="18" charset="0"/>
+              </a:rPr>
+              <a:t>O </a:t>
+            </a:r>
+            <a:r>
+              <a:rPr lang="pt-BR" sz="2400" b="1" dirty="0" err="1">
+                <a:solidFill>
+                  <a:schemeClr val="tx1"/>
+                </a:solidFill>
+                <a:latin typeface="Times" panose="02020603050405020304" pitchFamily="18" charset="0"/>
+                <a:cs typeface="Times" panose="02020603050405020304" pitchFamily="18" charset="0"/>
+              </a:rPr>
+              <a:t>Tomcat</a:t>
+            </a:r>
+            <a:r>
+              <a:rPr lang="pt-BR" sz="2400" dirty="0">
+                <a:solidFill>
+                  <a:schemeClr val="tx1"/>
+                </a:solidFill>
+                <a:latin typeface="Times" panose="02020603050405020304" pitchFamily="18" charset="0"/>
+                <a:cs typeface="Times" panose="02020603050405020304" pitchFamily="18" charset="0"/>
+              </a:rPr>
+              <a:t> é um </a:t>
+            </a:r>
+            <a:r>
+              <a:rPr lang="pt-BR" sz="2400" b="1" dirty="0">
+                <a:solidFill>
+                  <a:srgbClr val="FF0000"/>
+                </a:solidFill>
+                <a:latin typeface="Times" panose="02020603050405020304" pitchFamily="18" charset="0"/>
+                <a:cs typeface="Times" panose="02020603050405020304" pitchFamily="18" charset="0"/>
+              </a:rPr>
+              <a:t>servidor web Java</a:t>
+            </a:r>
+            <a:r>
+              <a:rPr lang="pt-BR" sz="2400" dirty="0">
+                <a:solidFill>
+                  <a:schemeClr val="tx1"/>
+                </a:solidFill>
+                <a:latin typeface="Times" panose="02020603050405020304" pitchFamily="18" charset="0"/>
+                <a:cs typeface="Times" panose="02020603050405020304" pitchFamily="18" charset="0"/>
+              </a:rPr>
+              <a:t>, mais especificamente, um </a:t>
+            </a:r>
+            <a:r>
+              <a:rPr lang="pt-BR" sz="2400" b="1" dirty="0">
+                <a:solidFill>
+                  <a:schemeClr val="tx1"/>
+                </a:solidFill>
+                <a:latin typeface="Times" panose="02020603050405020304" pitchFamily="18" charset="0"/>
+                <a:cs typeface="Times" panose="02020603050405020304" pitchFamily="18" charset="0"/>
+              </a:rPr>
+              <a:t>container de </a:t>
+            </a:r>
+            <a:r>
+              <a:rPr lang="pt-BR" sz="2400" b="1" dirty="0" err="1">
+                <a:solidFill>
+                  <a:schemeClr val="tx1"/>
+                </a:solidFill>
+                <a:latin typeface="Times" panose="02020603050405020304" pitchFamily="18" charset="0"/>
+                <a:cs typeface="Times" panose="02020603050405020304" pitchFamily="18" charset="0"/>
+              </a:rPr>
+              <a:t>servlets</a:t>
+            </a:r>
+            <a:r>
+              <a:rPr lang="pt-BR" sz="2400" dirty="0">
+                <a:solidFill>
+                  <a:schemeClr val="tx1"/>
+                </a:solidFill>
+                <a:latin typeface="Times" panose="02020603050405020304" pitchFamily="18" charset="0"/>
+                <a:cs typeface="Times" panose="02020603050405020304" pitchFamily="18" charset="0"/>
+              </a:rPr>
+              <a:t>. </a:t>
             </a:r>
           </a:p>
           <a:p>
             <a:pPr marL="0" indent="0" algn="just">
               <a:buNone/>
             </a:pPr>
-            <a:r>
-              <a:rPr lang="pt-BR" sz="2000" b="1" dirty="0">
-                <a:solidFill>
-                  <a:srgbClr val="FF0000"/>
-                </a:solidFill>
-                <a:latin typeface="Times New Roman" panose="02020603050405020304" pitchFamily="18" charset="0"/>
-                <a:cs typeface="Times New Roman" panose="02020603050405020304" pitchFamily="18" charset="0"/>
-              </a:rPr>
-              <a:t>Disponível em:</a:t>
-            </a:r>
+            <a:endParaRPr lang="pt-BR" sz="2400" dirty="0">
+              <a:solidFill>
+                <a:schemeClr val="tx1"/>
+              </a:solidFill>
+              <a:latin typeface="Times" panose="02020603050405020304" pitchFamily="18" charset="0"/>
+              <a:cs typeface="Times" panose="02020603050405020304" pitchFamily="18" charset="0"/>
+            </a:endParaRPr>
           </a:p>
           <a:p>
             <a:pPr marL="0" indent="0" algn="just">
               <a:buNone/>
             </a:pPr>
             <a:r>
-              <a:rPr lang="pt-BR" sz="2000" b="1" dirty="0">
-                <a:solidFill>
-                  <a:srgbClr val="FF0000"/>
-                </a:solidFill>
-                <a:latin typeface="Times New Roman" panose="02020603050405020304" pitchFamily="18" charset="0"/>
-                <a:cs typeface="Times New Roman" panose="02020603050405020304" pitchFamily="18" charset="0"/>
-              </a:rPr>
-              <a:t> </a:t>
-            </a:r>
-            <a:r>
-              <a:rPr lang="pt-BR" sz="2000" dirty="0">
-                <a:latin typeface="Times New Roman" panose="02020603050405020304" pitchFamily="18" charset="0"/>
-                <a:cs typeface="Times New Roman" panose="02020603050405020304" pitchFamily="18" charset="0"/>
-                <a:hlinkClick r:id="rId3"/>
-              </a:rPr>
-              <a:t>h</a:t>
-            </a:r>
-            <a:endParaRPr lang="pt-BR" sz="2000" dirty="0">
-              <a:latin typeface="Times New Roman" panose="02020603050405020304" pitchFamily="18" charset="0"/>
-              <a:cs typeface="Times New Roman" panose="02020603050405020304" pitchFamily="18" charset="0"/>
-            </a:endParaRPr>
+              <a:rPr lang="pt-BR" sz="2400" dirty="0">
+                <a:solidFill>
+                  <a:schemeClr val="tx1"/>
+                </a:solidFill>
+                <a:latin typeface="Times" panose="02020603050405020304" pitchFamily="18" charset="0"/>
+                <a:cs typeface="Times" panose="02020603050405020304" pitchFamily="18" charset="0"/>
+              </a:rPr>
+              <a:t>O </a:t>
+            </a:r>
+            <a:r>
+              <a:rPr lang="pt-BR" sz="2400" b="1" dirty="0" err="1">
+                <a:solidFill>
+                  <a:schemeClr val="tx1"/>
+                </a:solidFill>
+                <a:latin typeface="Times" panose="02020603050405020304" pitchFamily="18" charset="0"/>
+                <a:cs typeface="Times" panose="02020603050405020304" pitchFamily="18" charset="0"/>
+              </a:rPr>
+              <a:t>Tomcat</a:t>
+            </a:r>
+            <a:r>
+              <a:rPr lang="pt-BR" sz="2400" dirty="0">
+                <a:solidFill>
+                  <a:schemeClr val="tx1"/>
+                </a:solidFill>
+                <a:latin typeface="Times" panose="02020603050405020304" pitchFamily="18" charset="0"/>
+                <a:cs typeface="Times" panose="02020603050405020304" pitchFamily="18" charset="0"/>
+              </a:rPr>
+              <a:t> implementa, dentre outras de menor relevância, as tecnologias </a:t>
+            </a:r>
+            <a:r>
+              <a:rPr lang="pt-BR" sz="2400" b="1" dirty="0">
+                <a:solidFill>
+                  <a:schemeClr val="tx1"/>
+                </a:solidFill>
+                <a:latin typeface="Times" panose="02020603050405020304" pitchFamily="18" charset="0"/>
+                <a:cs typeface="Times" panose="02020603050405020304" pitchFamily="18" charset="0"/>
+              </a:rPr>
+              <a:t>Java </a:t>
+            </a:r>
+            <a:r>
+              <a:rPr lang="pt-BR" sz="2400" b="1" dirty="0" err="1">
+                <a:solidFill>
+                  <a:schemeClr val="tx1"/>
+                </a:solidFill>
+                <a:latin typeface="Times" panose="02020603050405020304" pitchFamily="18" charset="0"/>
+                <a:cs typeface="Times" panose="02020603050405020304" pitchFamily="18" charset="0"/>
+              </a:rPr>
+              <a:t>Servlet</a:t>
+            </a:r>
+            <a:r>
+              <a:rPr lang="pt-BR" sz="2400" dirty="0">
+                <a:solidFill>
+                  <a:schemeClr val="tx1"/>
+                </a:solidFill>
+                <a:latin typeface="Times" panose="02020603050405020304" pitchFamily="18" charset="0"/>
+                <a:cs typeface="Times" panose="02020603050405020304" pitchFamily="18" charset="0"/>
+              </a:rPr>
+              <a:t> e </a:t>
+            </a:r>
+            <a:r>
+              <a:rPr lang="pt-BR" sz="2400" b="1" dirty="0" err="1">
+                <a:solidFill>
+                  <a:schemeClr val="tx1"/>
+                </a:solidFill>
+                <a:latin typeface="Times" panose="02020603050405020304" pitchFamily="18" charset="0"/>
+                <a:cs typeface="Times" panose="02020603050405020304" pitchFamily="18" charset="0"/>
+              </a:rPr>
+              <a:t>JavaServer</a:t>
+            </a:r>
+            <a:r>
+              <a:rPr lang="pt-BR" sz="2400" b="1" dirty="0">
+                <a:solidFill>
+                  <a:schemeClr val="tx1"/>
+                </a:solidFill>
+                <a:latin typeface="Times" panose="02020603050405020304" pitchFamily="18" charset="0"/>
+                <a:cs typeface="Times" panose="02020603050405020304" pitchFamily="18" charset="0"/>
+              </a:rPr>
+              <a:t> Pages</a:t>
+            </a:r>
+            <a:r>
+              <a:rPr lang="pt-BR" sz="2400" dirty="0">
+                <a:solidFill>
+                  <a:schemeClr val="tx1"/>
+                </a:solidFill>
+                <a:latin typeface="Times" panose="02020603050405020304" pitchFamily="18" charset="0"/>
+                <a:cs typeface="Times" panose="02020603050405020304" pitchFamily="18" charset="0"/>
+              </a:rPr>
+              <a:t> e não é um container </a:t>
+            </a:r>
+            <a:r>
+              <a:rPr lang="pt-BR" sz="2400" b="1" dirty="0">
+                <a:solidFill>
+                  <a:schemeClr val="tx1"/>
+                </a:solidFill>
+                <a:latin typeface="Times" panose="02020603050405020304" pitchFamily="18" charset="0"/>
+                <a:cs typeface="Times" panose="02020603050405020304" pitchFamily="18" charset="0"/>
+              </a:rPr>
+              <a:t>Enterprise </a:t>
+            </a:r>
+            <a:r>
+              <a:rPr lang="pt-BR" sz="2400" b="1" dirty="0" err="1">
+                <a:solidFill>
+                  <a:schemeClr val="tx1"/>
+                </a:solidFill>
+                <a:latin typeface="Times" panose="02020603050405020304" pitchFamily="18" charset="0"/>
+                <a:cs typeface="Times" panose="02020603050405020304" pitchFamily="18" charset="0"/>
+              </a:rPr>
+              <a:t>JavaBeans</a:t>
+            </a:r>
+            <a:r>
+              <a:rPr lang="pt-BR" sz="2400" dirty="0">
+                <a:solidFill>
+                  <a:schemeClr val="tx1"/>
+                </a:solidFill>
+                <a:latin typeface="Times" panose="02020603050405020304" pitchFamily="18" charset="0"/>
+                <a:cs typeface="Times" panose="02020603050405020304" pitchFamily="18" charset="0"/>
+              </a:rPr>
+              <a:t>.</a:t>
+            </a:r>
           </a:p>
           <a:p>
             <a:pPr marL="0" indent="0" algn="just">
               <a:buNone/>
             </a:pPr>
-            <a:endParaRPr lang="pt-BR" sz="2000" dirty="0">
-              <a:latin typeface="Times New Roman" panose="02020603050405020304" pitchFamily="18" charset="0"/>
-              <a:cs typeface="Times New Roman" panose="02020603050405020304" pitchFamily="18" charset="0"/>
+            <a:endParaRPr lang="pt-BR" sz="2400" dirty="0">
+              <a:solidFill>
+                <a:schemeClr val="tx1"/>
+              </a:solidFill>
+              <a:latin typeface="Times" panose="02020603050405020304" pitchFamily="18" charset="0"/>
+              <a:cs typeface="Times" panose="02020603050405020304" pitchFamily="18" charset="0"/>
             </a:endParaRPr>
           </a:p>
           <a:p>
@@ -4632,55 +6026,41 @@
               <a:buNone/>
             </a:pPr>
             <a:r>
-              <a:rPr lang="pt-BR" sz="2000" dirty="0">
-                <a:latin typeface="Times New Roman" panose="02020603050405020304" pitchFamily="18" charset="0"/>
-                <a:cs typeface="Times New Roman" panose="02020603050405020304" pitchFamily="18" charset="0"/>
-              </a:rPr>
-              <a:t>[2] ... </a:t>
-            </a:r>
-          </a:p>
-          <a:p>
-            <a:pPr marL="0" indent="0" algn="just">
-              <a:buNone/>
-            </a:pPr>
-            <a:r>
-              <a:rPr lang="pt-BR" sz="2000" b="1" dirty="0">
+              <a:rPr lang="pt-BR" sz="2400" dirty="0">
+                <a:solidFill>
+                  <a:schemeClr val="tx1"/>
+                </a:solidFill>
+                <a:latin typeface="Times" panose="02020603050405020304" pitchFamily="18" charset="0"/>
+                <a:cs typeface="Times" panose="02020603050405020304" pitchFamily="18" charset="0"/>
+              </a:rPr>
+              <a:t>Desenvolvido pela </a:t>
+            </a:r>
+            <a:r>
+              <a:rPr lang="pt-BR" sz="2400" b="1" dirty="0">
                 <a:solidFill>
                   <a:srgbClr val="FF0000"/>
                 </a:solidFill>
-                <a:latin typeface="Times New Roman" panose="02020603050405020304" pitchFamily="18" charset="0"/>
-                <a:cs typeface="Times New Roman" panose="02020603050405020304" pitchFamily="18" charset="0"/>
-              </a:rPr>
-              <a:t>Disponível em: </a:t>
-            </a:r>
-            <a:r>
-              <a:rPr lang="pt-BR" sz="2000" dirty="0">
-                <a:latin typeface="Times New Roman" panose="02020603050405020304" pitchFamily="18" charset="0"/>
-                <a:cs typeface="Times New Roman" panose="02020603050405020304" pitchFamily="18" charset="0"/>
-                <a:hlinkClick r:id="rId4"/>
-              </a:rPr>
-              <a:t>h</a:t>
-            </a:r>
-            <a:endParaRPr lang="pt-BR" sz="2000" dirty="0">
-              <a:latin typeface="Times New Roman" panose="02020603050405020304" pitchFamily="18" charset="0"/>
-              <a:cs typeface="Times New Roman" panose="02020603050405020304" pitchFamily="18" charset="0"/>
-            </a:endParaRPr>
-          </a:p>
-          <a:p>
-            <a:pPr marL="0" indent="0" algn="just">
-              <a:buNone/>
-            </a:pPr>
-            <a:endParaRPr lang="pt-BR" sz="2000" dirty="0">
-              <a:latin typeface="Times New Roman" panose="02020603050405020304" pitchFamily="18" charset="0"/>
-              <a:cs typeface="Times New Roman" panose="02020603050405020304" pitchFamily="18" charset="0"/>
-            </a:endParaRPr>
-          </a:p>
-          <a:p>
-            <a:pPr marL="0" indent="0" algn="just">
-              <a:buNone/>
-            </a:pPr>
-            <a:endParaRPr lang="pt-BR" sz="2000" dirty="0">
-              <a:latin typeface="Calibri" panose="020F0502020204030204" pitchFamily="34" charset="0"/>
+                <a:latin typeface="Times" panose="02020603050405020304" pitchFamily="18" charset="0"/>
+                <a:cs typeface="Times" panose="02020603050405020304" pitchFamily="18" charset="0"/>
+              </a:rPr>
+              <a:t>Apache Software Foundation</a:t>
+            </a:r>
+            <a:r>
+              <a:rPr lang="pt-BR" sz="2400" dirty="0">
+                <a:solidFill>
+                  <a:schemeClr val="tx1"/>
+                </a:solidFill>
+                <a:latin typeface="Times" panose="02020603050405020304" pitchFamily="18" charset="0"/>
+                <a:cs typeface="Times" panose="02020603050405020304" pitchFamily="18" charset="0"/>
+              </a:rPr>
+              <a:t>, é distribuído como software livre.</a:t>
+            </a:r>
+            <a:endParaRPr lang="pt-BR" sz="1800" b="1" dirty="0">
+              <a:solidFill>
+                <a:srgbClr val="FF0000"/>
+              </a:solidFill>
+              <a:latin typeface="Times" panose="02020603050405020304" pitchFamily="18" charset="0"/>
+              <a:cs typeface="Times" panose="02020603050405020304" pitchFamily="18" charset="0"/>
             </a:endParaRPr>
           </a:p>
         </p:txBody>
@@ -4688,7 +6068,7 @@
     </p:spTree>
     <p:extLst>
       <p:ext uri="{BB962C8B-B14F-4D97-AF65-F5344CB8AC3E}">
-        <p14:creationId xmlns:p14="http://schemas.microsoft.com/office/powerpoint/2010/main" val="4175167667"/>
+        <p14:creationId xmlns:p14="http://schemas.microsoft.com/office/powerpoint/2010/main" val="1806113362"/>
       </p:ext>
     </p:extLst>
   </p:cSld>
@@ -4739,20 +6119,12 @@
           <a:lstStyle/>
           <a:p>
             <a:r>
-              <a:rPr lang="en-US" b="1" dirty="0" err="1">
+              <a:rPr lang="en-US" b="1" dirty="0">
                 <a:solidFill>
                   <a:srgbClr val="0070C0"/>
                 </a:solidFill>
               </a:rPr>
-              <a:t>Aprenda</a:t>
-            </a:r>
-            <a:r>
-              <a:rPr lang="en-US" b="1" dirty="0">
-                <a:solidFill>
-                  <a:srgbClr val="0070C0"/>
-                </a:solidFill>
-              </a:rPr>
-              <a:t>+</a:t>
+              <a:t>Server Apache Tomcat</a:t>
             </a:r>
           </a:p>
         </p:txBody>
@@ -4770,7 +6142,7 @@
         <p:spPr>
           <a:xfrm>
             <a:off x="142865" y="1200150"/>
-            <a:ext cx="8865056" cy="3737370"/>
+            <a:ext cx="8865056" cy="3847338"/>
           </a:xfrm>
         </p:spPr>
         <p:txBody>
@@ -4783,98 +6155,178 @@
               <a:buNone/>
             </a:pPr>
             <a:r>
+              <a:rPr lang="pt-BR" sz="2400" b="1" dirty="0" err="1">
+                <a:solidFill>
+                  <a:schemeClr val="tx1"/>
+                </a:solidFill>
+                <a:latin typeface="Times" panose="02020603050405020304" pitchFamily="18" charset="0"/>
+                <a:cs typeface="Times" panose="02020603050405020304" pitchFamily="18" charset="0"/>
+              </a:rPr>
+              <a:t>Servlets</a:t>
+            </a:r>
+            <a:r>
               <a:rPr lang="pt-BR" sz="2400" dirty="0">
-                <a:latin typeface="Times New Roman" panose="02020603050405020304" pitchFamily="18" charset="0"/>
-                <a:cs typeface="Times New Roman" panose="02020603050405020304" pitchFamily="18" charset="0"/>
-              </a:rPr>
-              <a:t>[1] ...</a:t>
-            </a:r>
-          </a:p>
-          <a:p>
-            <a:pPr marL="0" indent="0" algn="just">
-              <a:buNone/>
-            </a:pPr>
+                <a:solidFill>
+                  <a:schemeClr val="tx1"/>
+                </a:solidFill>
+                <a:latin typeface="Times" panose="02020603050405020304" pitchFamily="18" charset="0"/>
+                <a:cs typeface="Times" panose="02020603050405020304" pitchFamily="18" charset="0"/>
+              </a:rPr>
+              <a:t> são </a:t>
+            </a:r>
             <a:r>
               <a:rPr lang="pt-BR" sz="2400" b="1" dirty="0">
                 <a:solidFill>
                   <a:srgbClr val="FF0000"/>
                 </a:solidFill>
-                <a:latin typeface="Times New Roman" panose="02020603050405020304" pitchFamily="18" charset="0"/>
-                <a:cs typeface="Times New Roman" panose="02020603050405020304" pitchFamily="18" charset="0"/>
-              </a:rPr>
-              <a:t>Disponível em: </a:t>
+                <a:latin typeface="Times" panose="02020603050405020304" pitchFamily="18" charset="0"/>
+                <a:cs typeface="Times" panose="02020603050405020304" pitchFamily="18" charset="0"/>
+              </a:rPr>
+              <a:t>classes Java</a:t>
             </a:r>
             <a:r>
               <a:rPr lang="pt-BR" sz="2400" dirty="0">
-                <a:latin typeface="Times New Roman" panose="02020603050405020304" pitchFamily="18" charset="0"/>
-                <a:cs typeface="Times New Roman" panose="02020603050405020304" pitchFamily="18" charset="0"/>
-                <a:hlinkClick r:id="rId3"/>
-              </a:rPr>
-              <a:t>h</a:t>
-            </a:r>
-            <a:endParaRPr lang="pt-BR" sz="2400" dirty="0">
-              <a:latin typeface="Times New Roman" panose="02020603050405020304" pitchFamily="18" charset="0"/>
-              <a:cs typeface="Times New Roman" panose="02020603050405020304" pitchFamily="18" charset="0"/>
-            </a:endParaRPr>
-          </a:p>
-          <a:p>
-            <a:pPr marL="0" indent="0" algn="just">
-              <a:buNone/>
-            </a:pPr>
+                <a:solidFill>
+                  <a:schemeClr val="tx1"/>
+                </a:solidFill>
+                <a:latin typeface="Times" panose="02020603050405020304" pitchFamily="18" charset="0"/>
+                <a:cs typeface="Times" panose="02020603050405020304" pitchFamily="18" charset="0"/>
+              </a:rPr>
+              <a:t>, desenvolvidas de acordo com uma estrutura bem definida que quando instaladas e configuradas em um Servidor que implemente um </a:t>
+            </a:r>
+            <a:r>
+              <a:rPr lang="pt-BR" sz="2400" b="1" dirty="0" err="1">
+                <a:solidFill>
+                  <a:schemeClr val="tx1"/>
+                </a:solidFill>
+                <a:latin typeface="Times" panose="02020603050405020304" pitchFamily="18" charset="0"/>
+                <a:cs typeface="Times" panose="02020603050405020304" pitchFamily="18" charset="0"/>
+              </a:rPr>
+              <a:t>Servlet</a:t>
+            </a:r>
             <a:r>
               <a:rPr lang="pt-BR" sz="2400" dirty="0">
-                <a:latin typeface="Times New Roman" panose="02020603050405020304" pitchFamily="18" charset="0"/>
-                <a:cs typeface="Times New Roman" panose="02020603050405020304" pitchFamily="18" charset="0"/>
-              </a:rPr>
-              <a:t>		  </a:t>
-            </a:r>
-          </a:p>
-          <a:p>
-            <a:pPr marL="0" indent="0" algn="just">
-              <a:buNone/>
-            </a:pPr>
+                <a:solidFill>
+                  <a:schemeClr val="tx1"/>
+                </a:solidFill>
+                <a:latin typeface="Times" panose="02020603050405020304" pitchFamily="18" charset="0"/>
+                <a:cs typeface="Times" panose="02020603050405020304" pitchFamily="18" charset="0"/>
+              </a:rPr>
+              <a:t> Container, podem tratar requisições recebidas de </a:t>
+            </a:r>
+            <a:r>
+              <a:rPr lang="pt-BR" sz="2400" b="1" dirty="0">
+                <a:solidFill>
+                  <a:srgbClr val="FF0000"/>
+                </a:solidFill>
+                <a:latin typeface="Times" panose="02020603050405020304" pitchFamily="18" charset="0"/>
+                <a:cs typeface="Times" panose="02020603050405020304" pitchFamily="18" charset="0"/>
+              </a:rPr>
+              <a:t>clientes Web</a:t>
+            </a:r>
             <a:r>
               <a:rPr lang="pt-BR" sz="2400" dirty="0">
-                <a:latin typeface="Times New Roman" panose="02020603050405020304" pitchFamily="18" charset="0"/>
-                <a:cs typeface="Times New Roman" panose="02020603050405020304" pitchFamily="18" charset="0"/>
-              </a:rPr>
-              <a:t>[2] ... </a:t>
-            </a:r>
-          </a:p>
-          <a:p>
-            <a:pPr marL="0" indent="0" algn="just">
-              <a:buNone/>
-            </a:pPr>
+                <a:solidFill>
+                  <a:schemeClr val="tx1"/>
+                </a:solidFill>
+                <a:latin typeface="Times" panose="02020603050405020304" pitchFamily="18" charset="0"/>
+                <a:cs typeface="Times" panose="02020603050405020304" pitchFamily="18" charset="0"/>
+              </a:rPr>
+              <a:t>, como por exemplo os Browsers (</a:t>
+            </a:r>
             <a:r>
               <a:rPr lang="pt-BR" sz="2400" b="1" dirty="0">
                 <a:solidFill>
-                  <a:srgbClr val="FF0000"/>
-                </a:solidFill>
-                <a:latin typeface="Times New Roman" panose="02020603050405020304" pitchFamily="18" charset="0"/>
-                <a:cs typeface="Times New Roman" panose="02020603050405020304" pitchFamily="18" charset="0"/>
-              </a:rPr>
-              <a:t>Disponível em: </a:t>
+                  <a:schemeClr val="tx1"/>
+                </a:solidFill>
+                <a:latin typeface="Times" panose="02020603050405020304" pitchFamily="18" charset="0"/>
+                <a:cs typeface="Times" panose="02020603050405020304" pitchFamily="18" charset="0"/>
+              </a:rPr>
+              <a:t>Internet Explorer® e Mozilla Firefox®</a:t>
             </a:r>
             <a:r>
               <a:rPr lang="pt-BR" sz="2400" dirty="0">
-                <a:latin typeface="Times New Roman" panose="02020603050405020304" pitchFamily="18" charset="0"/>
-                <a:cs typeface="Times New Roman" panose="02020603050405020304" pitchFamily="18" charset="0"/>
-                <a:hlinkClick r:id="rId4"/>
-              </a:rPr>
-              <a:t>h</a:t>
-            </a:r>
-            <a:endParaRPr lang="pt-BR" sz="2400" dirty="0">
-              <a:latin typeface="Times New Roman" panose="02020603050405020304" pitchFamily="18" charset="0"/>
-              <a:cs typeface="Times New Roman" panose="02020603050405020304" pitchFamily="18" charset="0"/>
-            </a:endParaRPr>
+                <a:solidFill>
+                  <a:schemeClr val="tx1"/>
+                </a:solidFill>
+                <a:latin typeface="Times" panose="02020603050405020304" pitchFamily="18" charset="0"/>
+                <a:cs typeface="Times" panose="02020603050405020304" pitchFamily="18" charset="0"/>
+              </a:rPr>
+              <a:t>).</a:t>
+            </a:r>
           </a:p>
           <a:p>
             <a:pPr marL="0" indent="0" algn="just">
               <a:buNone/>
             </a:pPr>
             <a:endParaRPr lang="pt-BR" sz="2400" dirty="0">
-              <a:latin typeface="Times New Roman" panose="02020603050405020304" pitchFamily="18" charset="0"/>
-              <a:cs typeface="Times New Roman" panose="02020603050405020304" pitchFamily="18" charset="0"/>
+              <a:solidFill>
+                <a:schemeClr val="tx1"/>
+              </a:solidFill>
+              <a:latin typeface="Times" panose="02020603050405020304" pitchFamily="18" charset="0"/>
+              <a:cs typeface="Times" panose="02020603050405020304" pitchFamily="18" charset="0"/>
+            </a:endParaRPr>
+          </a:p>
+          <a:p>
+            <a:pPr marL="0" indent="0" algn="just">
+              <a:buNone/>
+            </a:pPr>
+            <a:r>
+              <a:rPr lang="pt-BR" sz="2400" dirty="0">
+                <a:solidFill>
+                  <a:schemeClr val="tx1"/>
+                </a:solidFill>
+                <a:latin typeface="Times" panose="02020603050405020304" pitchFamily="18" charset="0"/>
+                <a:cs typeface="Times" panose="02020603050405020304" pitchFamily="18" charset="0"/>
+              </a:rPr>
+              <a:t>Ao receber uma requisição, um </a:t>
+            </a:r>
+            <a:r>
+              <a:rPr lang="pt-BR" sz="2400" b="1" dirty="0" err="1">
+                <a:solidFill>
+                  <a:schemeClr val="tx1"/>
+                </a:solidFill>
+                <a:latin typeface="Times" panose="02020603050405020304" pitchFamily="18" charset="0"/>
+                <a:cs typeface="Times" panose="02020603050405020304" pitchFamily="18" charset="0"/>
+              </a:rPr>
+              <a:t>Servlet</a:t>
+            </a:r>
+            <a:r>
+              <a:rPr lang="pt-BR" sz="2400" dirty="0">
+                <a:solidFill>
+                  <a:schemeClr val="tx1"/>
+                </a:solidFill>
+                <a:latin typeface="Times" panose="02020603050405020304" pitchFamily="18" charset="0"/>
+                <a:cs typeface="Times" panose="02020603050405020304" pitchFamily="18" charset="0"/>
+              </a:rPr>
+              <a:t> pode capturar os parâmetros desta requisição, efetuar qualquer processamento inerente a uma classe Java, e devolver uma </a:t>
+            </a:r>
+            <a:r>
+              <a:rPr lang="pt-BR" sz="2400" b="1" dirty="0">
+                <a:solidFill>
+                  <a:srgbClr val="FF0000"/>
+                </a:solidFill>
+                <a:latin typeface="Times" panose="02020603050405020304" pitchFamily="18" charset="0"/>
+                <a:cs typeface="Times" panose="02020603050405020304" pitchFamily="18" charset="0"/>
+              </a:rPr>
+              <a:t>página HTML</a:t>
+            </a:r>
+            <a:r>
+              <a:rPr lang="pt-BR" sz="2400" dirty="0">
+                <a:solidFill>
+                  <a:schemeClr val="tx1"/>
+                </a:solidFill>
+                <a:latin typeface="Times" panose="02020603050405020304" pitchFamily="18" charset="0"/>
+                <a:cs typeface="Times" panose="02020603050405020304" pitchFamily="18" charset="0"/>
+              </a:rPr>
+              <a:t>.</a:t>
+            </a:r>
+            <a:endParaRPr lang="pt-BR" sz="1800" b="1" dirty="0">
+              <a:solidFill>
+                <a:srgbClr val="FF0000"/>
+              </a:solidFill>
+              <a:latin typeface="Times" panose="02020603050405020304" pitchFamily="18" charset="0"/>
+              <a:cs typeface="Times" panose="02020603050405020304" pitchFamily="18" charset="0"/>
             </a:endParaRPr>
           </a:p>
         </p:txBody>
@@ -4882,7 +6334,7 @@
     </p:spTree>
     <p:extLst>
       <p:ext uri="{BB962C8B-B14F-4D97-AF65-F5344CB8AC3E}">
-        <p14:creationId xmlns:p14="http://schemas.microsoft.com/office/powerpoint/2010/main" val="2747596967"/>
+        <p14:creationId xmlns:p14="http://schemas.microsoft.com/office/powerpoint/2010/main" val="384474671"/>
       </p:ext>
     </p:extLst>
   </p:cSld>
@@ -4933,34 +6385,13 @@
           <a:lstStyle/>
           <a:p>
             <a:r>
-              <a:rPr lang="en-US" b="1" dirty="0" err="1">
+              <a:rPr lang="en-US" b="1" dirty="0">
                 <a:solidFill>
                   <a:srgbClr val="0070C0"/>
                 </a:solidFill>
               </a:rPr>
-              <a:t>Dinâmica</a:t>
-            </a:r>
-            <a:r>
-              <a:rPr lang="en-US" b="1" dirty="0">
-                <a:solidFill>
-                  <a:srgbClr val="0070C0"/>
-                </a:solidFill>
-              </a:rPr>
-              <a:t>/</a:t>
-            </a:r>
-            <a:r>
-              <a:rPr lang="en-US" b="1" dirty="0" err="1">
-                <a:solidFill>
-                  <a:srgbClr val="0070C0"/>
-                </a:solidFill>
-              </a:rPr>
-              <a:t>Atividades</a:t>
-            </a:r>
-            <a:endParaRPr lang="en-US" b="1" dirty="0">
-              <a:solidFill>
-                <a:srgbClr val="0070C0"/>
-              </a:solidFill>
-            </a:endParaRPr>
+              <a:t>Server Apache Tomcat</a:t>
+            </a:r>
           </a:p>
         </p:txBody>
       </p:sp>
@@ -4976,8 +6407,8 @@
         </p:nvSpPr>
         <p:spPr>
           <a:xfrm>
-            <a:off x="139472" y="1063230"/>
-            <a:ext cx="8865056" cy="3606305"/>
+            <a:off x="142865" y="1200150"/>
+            <a:ext cx="8865056" cy="3847338"/>
           </a:xfrm>
         </p:spPr>
         <p:txBody>
@@ -4989,36 +6420,174 @@
             <a:pPr marL="0" indent="0" algn="just">
               <a:buNone/>
             </a:pPr>
-            <a:endParaRPr lang="pt-BR" sz="2000" dirty="0">
-              <a:latin typeface="Times New Roman" panose="02020603050405020304" pitchFamily="18" charset="0"/>
-              <a:cs typeface="Times New Roman" panose="02020603050405020304" pitchFamily="18" charset="0"/>
-            </a:endParaRPr>
+            <a:r>
+              <a:rPr lang="pt-BR" sz="2400" dirty="0">
+                <a:solidFill>
+                  <a:schemeClr val="tx1"/>
+                </a:solidFill>
+                <a:latin typeface="Times" panose="02020603050405020304" pitchFamily="18" charset="0"/>
+                <a:cs typeface="Times" panose="02020603050405020304" pitchFamily="18" charset="0"/>
+              </a:rPr>
+              <a:t>São basicamente </a:t>
+            </a:r>
+            <a:r>
+              <a:rPr lang="pt-BR" sz="2400" b="1" dirty="0">
+                <a:solidFill>
+                  <a:schemeClr val="tx1"/>
+                </a:solidFill>
+                <a:latin typeface="Times" panose="02020603050405020304" pitchFamily="18" charset="0"/>
+                <a:cs typeface="Times" panose="02020603050405020304" pitchFamily="18" charset="0"/>
+              </a:rPr>
+              <a:t>módulos de software</a:t>
+            </a:r>
+            <a:r>
+              <a:rPr lang="pt-BR" sz="2400" dirty="0">
+                <a:solidFill>
+                  <a:schemeClr val="tx1"/>
+                </a:solidFill>
+                <a:latin typeface="Times" panose="02020603050405020304" pitchFamily="18" charset="0"/>
+                <a:cs typeface="Times" panose="02020603050405020304" pitchFamily="18" charset="0"/>
+              </a:rPr>
+              <a:t> que são executados em um </a:t>
+            </a:r>
+            <a:r>
+              <a:rPr lang="pt-BR" sz="2400" b="1" dirty="0">
+                <a:solidFill>
+                  <a:srgbClr val="FF0000"/>
+                </a:solidFill>
+                <a:latin typeface="Times" panose="02020603050405020304" pitchFamily="18" charset="0"/>
+                <a:cs typeface="Times" panose="02020603050405020304" pitchFamily="18" charset="0"/>
+              </a:rPr>
+              <a:t>servidor web</a:t>
+            </a:r>
+            <a:r>
+              <a:rPr lang="pt-BR" sz="2400" dirty="0">
+                <a:solidFill>
+                  <a:schemeClr val="tx1"/>
+                </a:solidFill>
+                <a:latin typeface="Times" panose="02020603050405020304" pitchFamily="18" charset="0"/>
+                <a:cs typeface="Times" panose="02020603050405020304" pitchFamily="18" charset="0"/>
+              </a:rPr>
+              <a:t> para atender as </a:t>
+            </a:r>
+            <a:r>
+              <a:rPr lang="pt-BR" sz="2400" b="1" dirty="0">
+                <a:solidFill>
+                  <a:schemeClr val="tx1"/>
+                </a:solidFill>
+                <a:latin typeface="Times" panose="02020603050405020304" pitchFamily="18" charset="0"/>
+                <a:cs typeface="Times" panose="02020603050405020304" pitchFamily="18" charset="0"/>
+              </a:rPr>
+              <a:t>requisições de aplicações cliente</a:t>
+            </a:r>
+            <a:r>
+              <a:rPr lang="pt-BR" sz="2400" dirty="0">
+                <a:solidFill>
+                  <a:schemeClr val="tx1"/>
+                </a:solidFill>
+                <a:latin typeface="Times" panose="02020603050405020304" pitchFamily="18" charset="0"/>
+                <a:cs typeface="Times" panose="02020603050405020304" pitchFamily="18" charset="0"/>
+              </a:rPr>
+              <a:t> e prestar-lhes algum tipo de serviço.</a:t>
+            </a:r>
           </a:p>
           <a:p>
             <a:pPr marL="0" indent="0" algn="just">
               <a:buNone/>
             </a:pPr>
-            <a:endParaRPr lang="pt-BR" sz="2000" dirty="0">
-              <a:latin typeface="Times New Roman" panose="02020603050405020304" pitchFamily="18" charset="0"/>
-              <a:cs typeface="Times New Roman" panose="02020603050405020304" pitchFamily="18" charset="0"/>
+            <a:endParaRPr lang="pt-BR" sz="2400" dirty="0">
+              <a:solidFill>
+                <a:schemeClr val="tx1"/>
+              </a:solidFill>
+              <a:latin typeface="Times" panose="02020603050405020304" pitchFamily="18" charset="0"/>
+              <a:cs typeface="Times" panose="02020603050405020304" pitchFamily="18" charset="0"/>
             </a:endParaRPr>
           </a:p>
           <a:p>
             <a:pPr marL="0" indent="0" algn="just">
               <a:buNone/>
             </a:pPr>
-            <a:endParaRPr lang="pt-BR" sz="2000" dirty="0">
-              <a:latin typeface="Times New Roman" panose="02020603050405020304" pitchFamily="18" charset="0"/>
-              <a:cs typeface="Times New Roman" panose="02020603050405020304" pitchFamily="18" charset="0"/>
-            </a:endParaRPr>
+            <a:r>
+              <a:rPr lang="pt-BR" sz="2400" dirty="0">
+                <a:solidFill>
+                  <a:schemeClr val="tx1"/>
+                </a:solidFill>
+                <a:latin typeface="Times" panose="02020603050405020304" pitchFamily="18" charset="0"/>
+                <a:cs typeface="Times" panose="02020603050405020304" pitchFamily="18" charset="0"/>
+              </a:rPr>
+              <a:t>Ou seja, quando você </a:t>
+            </a:r>
+            <a:r>
+              <a:rPr lang="pt-BR" sz="2400" b="1" dirty="0">
+                <a:solidFill>
+                  <a:schemeClr val="tx1"/>
+                </a:solidFill>
+                <a:latin typeface="Times" panose="02020603050405020304" pitchFamily="18" charset="0"/>
+                <a:cs typeface="Times" panose="02020603050405020304" pitchFamily="18" charset="0"/>
+              </a:rPr>
+              <a:t>recebe</a:t>
+            </a:r>
+            <a:r>
+              <a:rPr lang="pt-BR" sz="2400" dirty="0">
+                <a:solidFill>
+                  <a:schemeClr val="tx1"/>
+                </a:solidFill>
+                <a:latin typeface="Times" panose="02020603050405020304" pitchFamily="18" charset="0"/>
+                <a:cs typeface="Times" panose="02020603050405020304" pitchFamily="18" charset="0"/>
+              </a:rPr>
+              <a:t> sua </a:t>
+            </a:r>
+            <a:r>
+              <a:rPr lang="pt-BR" sz="2400" b="1" dirty="0">
+                <a:solidFill>
+                  <a:schemeClr val="tx1"/>
+                </a:solidFill>
+                <a:latin typeface="Times" panose="02020603050405020304" pitchFamily="18" charset="0"/>
+                <a:cs typeface="Times" panose="02020603050405020304" pitchFamily="18" charset="0"/>
+              </a:rPr>
+              <a:t>requisição</a:t>
+            </a:r>
+            <a:r>
+              <a:rPr lang="pt-BR" sz="2400" dirty="0">
+                <a:solidFill>
+                  <a:schemeClr val="tx1"/>
+                </a:solidFill>
+                <a:latin typeface="Times" panose="02020603050405020304" pitchFamily="18" charset="0"/>
+                <a:cs typeface="Times" panose="02020603050405020304" pitchFamily="18" charset="0"/>
+              </a:rPr>
+              <a:t> na </a:t>
+            </a:r>
+            <a:r>
+              <a:rPr lang="pt-BR" sz="2400" b="1" dirty="0" err="1">
+                <a:solidFill>
+                  <a:schemeClr val="tx1"/>
+                </a:solidFill>
+                <a:latin typeface="Times" panose="02020603050405020304" pitchFamily="18" charset="0"/>
+                <a:cs typeface="Times" panose="02020603050405020304" pitchFamily="18" charset="0"/>
+              </a:rPr>
+              <a:t>view</a:t>
+            </a:r>
+            <a:r>
+              <a:rPr lang="pt-BR" sz="2400" dirty="0">
+                <a:solidFill>
+                  <a:schemeClr val="tx1"/>
+                </a:solidFill>
+                <a:latin typeface="Times" panose="02020603050405020304" pitchFamily="18" charset="0"/>
+                <a:cs typeface="Times" panose="02020603050405020304" pitchFamily="18" charset="0"/>
+              </a:rPr>
+              <a:t>, você precisa receber essa requisição, processar e enviar uma resposta. </a:t>
+            </a:r>
           </a:p>
           <a:p>
             <a:pPr marL="0" indent="0" algn="just">
               <a:buNone/>
             </a:pPr>
-            <a:endParaRPr lang="pt-BR" sz="2000" dirty="0">
-              <a:latin typeface="Times New Roman" panose="02020603050405020304" pitchFamily="18" charset="0"/>
-              <a:cs typeface="Times New Roman" panose="02020603050405020304" pitchFamily="18" charset="0"/>
+            <a:endParaRPr lang="pt-BR" sz="2400" dirty="0">
+              <a:solidFill>
+                <a:schemeClr val="tx1"/>
+              </a:solidFill>
+              <a:latin typeface="Times" panose="02020603050405020304" pitchFamily="18" charset="0"/>
+              <a:cs typeface="Times" panose="02020603050405020304" pitchFamily="18" charset="0"/>
             </a:endParaRPr>
           </a:p>
           <a:p>
@@ -5026,28 +6595,41 @@
               <a:buNone/>
             </a:pPr>
             <a:r>
-              <a:rPr lang="pt-BR" sz="2000" dirty="0">
-                <a:latin typeface="Times New Roman" panose="02020603050405020304" pitchFamily="18" charset="0"/>
-                <a:cs typeface="Times New Roman" panose="02020603050405020304" pitchFamily="18" charset="0"/>
-              </a:rPr>
-              <a:t>- </a:t>
-            </a:r>
-            <a:r>
-              <a:rPr lang="pt-BR" sz="2000" b="1" dirty="0" err="1">
-                <a:latin typeface="Times New Roman" panose="02020603050405020304" pitchFamily="18" charset="0"/>
-                <a:cs typeface="Times New Roman" panose="02020603050405020304" pitchFamily="18" charset="0"/>
-              </a:rPr>
-              <a:t>Deploy</a:t>
-            </a:r>
-            <a:r>
-              <a:rPr lang="pt-BR" sz="2000" b="1" dirty="0">
-                <a:latin typeface="Times New Roman" panose="02020603050405020304" pitchFamily="18" charset="0"/>
-                <a:cs typeface="Times New Roman" panose="02020603050405020304" pitchFamily="18" charset="0"/>
-              </a:rPr>
-              <a:t> Web Apache no SO Linux</a:t>
-            </a:r>
-            <a:endParaRPr lang="pt-BR" sz="2000" dirty="0">
-              <a:latin typeface="Calibri" panose="020F0502020204030204" pitchFamily="34" charset="0"/>
+              <a:rPr lang="pt-BR" sz="2400" dirty="0">
+                <a:solidFill>
+                  <a:schemeClr val="tx1"/>
+                </a:solidFill>
+                <a:latin typeface="Times" panose="02020603050405020304" pitchFamily="18" charset="0"/>
+                <a:cs typeface="Times" panose="02020603050405020304" pitchFamily="18" charset="0"/>
+              </a:rPr>
+              <a:t>A </a:t>
+            </a:r>
+            <a:r>
+              <a:rPr lang="pt-BR" sz="2400" b="1" dirty="0" err="1">
+                <a:solidFill>
+                  <a:schemeClr val="tx1"/>
+                </a:solidFill>
+                <a:latin typeface="Times" panose="02020603050405020304" pitchFamily="18" charset="0"/>
+                <a:cs typeface="Times" panose="02020603050405020304" pitchFamily="18" charset="0"/>
+              </a:rPr>
+              <a:t>Servlet</a:t>
+            </a:r>
+            <a:r>
+              <a:rPr lang="pt-BR" sz="2400" dirty="0">
+                <a:solidFill>
+                  <a:schemeClr val="tx1"/>
+                </a:solidFill>
+                <a:latin typeface="Times" panose="02020603050405020304" pitchFamily="18" charset="0"/>
+                <a:cs typeface="Times" panose="02020603050405020304" pitchFamily="18" charset="0"/>
+              </a:rPr>
+              <a:t> recebe sua requisição, processa ou envia pra alguém processar e então retorna a resposta pra onde necessitar.</a:t>
+            </a:r>
+            <a:endParaRPr lang="pt-BR" sz="1800" b="1" dirty="0">
+              <a:solidFill>
+                <a:srgbClr val="FF0000"/>
+              </a:solidFill>
+              <a:latin typeface="Times" panose="02020603050405020304" pitchFamily="18" charset="0"/>
+              <a:cs typeface="Times" panose="02020603050405020304" pitchFamily="18" charset="0"/>
             </a:endParaRPr>
           </a:p>
         </p:txBody>
@@ -5055,7 +6637,7 @@
     </p:spTree>
     <p:extLst>
       <p:ext uri="{BB962C8B-B14F-4D97-AF65-F5344CB8AC3E}">
-        <p14:creationId xmlns:p14="http://schemas.microsoft.com/office/powerpoint/2010/main" val="2470652989"/>
+        <p14:creationId xmlns:p14="http://schemas.microsoft.com/office/powerpoint/2010/main" val="3385461994"/>
       </p:ext>
     </p:extLst>
   </p:cSld>
@@ -5106,34 +6688,13 @@
           <a:lstStyle/>
           <a:p>
             <a:r>
-              <a:rPr lang="en-US" b="1" dirty="0" err="1">
+              <a:rPr lang="en-US" b="1" dirty="0">
                 <a:solidFill>
                   <a:srgbClr val="0070C0"/>
                 </a:solidFill>
               </a:rPr>
-              <a:t>Referências</a:t>
-            </a:r>
-            <a:r>
-              <a:rPr lang="en-US" b="1" dirty="0">
-                <a:solidFill>
-                  <a:srgbClr val="0070C0"/>
-                </a:solidFill>
-              </a:rPr>
-              <a:t> </a:t>
-            </a:r>
-            <a:r>
-              <a:rPr lang="en-US" b="1" dirty="0" err="1">
-                <a:solidFill>
-                  <a:srgbClr val="0070C0"/>
-                </a:solidFill>
-              </a:rPr>
-              <a:t>Bibliográficas</a:t>
-            </a:r>
-            <a:endParaRPr lang="en-US" b="1" dirty="0">
-              <a:solidFill>
-                <a:srgbClr val="0070C0"/>
-              </a:solidFill>
-            </a:endParaRPr>
+              <a:t>Web Apache - XAMPP</a:t>
+            </a:r>
           </a:p>
         </p:txBody>
       </p:sp>
@@ -5149,8 +6710,8 @@
         </p:nvSpPr>
         <p:spPr>
           <a:xfrm>
-            <a:off x="142865" y="1200151"/>
-            <a:ext cx="8865056" cy="3394472"/>
+            <a:off x="142865" y="1200150"/>
+            <a:ext cx="8865056" cy="3847338"/>
           </a:xfrm>
         </p:spPr>
         <p:txBody>
@@ -5163,92 +6724,122 @@
               <a:buNone/>
             </a:pPr>
             <a:r>
-              <a:rPr lang="pt-BR" sz="2000" dirty="0">
+              <a:rPr lang="pt-BR" sz="2400" dirty="0">
                 <a:solidFill>
                   <a:schemeClr val="tx1"/>
                 </a:solidFill>
-                <a:latin typeface="Times New Roman" panose="02020603050405020304" pitchFamily="18" charset="0"/>
-                <a:cs typeface="Times New Roman" panose="02020603050405020304" pitchFamily="18" charset="0"/>
-              </a:rPr>
-              <a:t>[1].</a:t>
+                <a:latin typeface="Times" panose="02020603050405020304" pitchFamily="18" charset="0"/>
+                <a:cs typeface="Times" panose="02020603050405020304" pitchFamily="18" charset="0"/>
+              </a:rPr>
+              <a:t>Ambiente de desenvolvimento em PHP, gratuito e fácil de instalar a distribuição Apache, contendo MySQL, PHP e Perl. </a:t>
             </a:r>
           </a:p>
           <a:p>
             <a:pPr marL="0" indent="0" algn="just">
               <a:buNone/>
             </a:pPr>
-            <a:endParaRPr lang="pt-BR" sz="2000" dirty="0">
+            <a:endParaRPr lang="pt-BR" sz="2400" dirty="0">
               <a:solidFill>
                 <a:schemeClr val="tx1"/>
               </a:solidFill>
-              <a:latin typeface="Times New Roman" panose="02020603050405020304" pitchFamily="18" charset="0"/>
-              <a:cs typeface="Times New Roman" panose="02020603050405020304" pitchFamily="18" charset="0"/>
+              <a:latin typeface="Times" panose="02020603050405020304" pitchFamily="18" charset="0"/>
+              <a:cs typeface="Times" panose="02020603050405020304" pitchFamily="18" charset="0"/>
             </a:endParaRPr>
           </a:p>
           <a:p>
             <a:pPr marL="0" indent="0" algn="just">
               <a:buNone/>
-              <a:tabLst>
-                <a:tab pos="457200" algn="l"/>
-              </a:tabLst>
             </a:pPr>
             <a:r>
-              <a:rPr lang="pt-BR" sz="2000" dirty="0">
+              <a:rPr lang="pt-BR" sz="2400" dirty="0">
                 <a:solidFill>
                   <a:schemeClr val="tx1"/>
                 </a:solidFill>
-                <a:latin typeface="Times New Roman" panose="02020603050405020304" pitchFamily="18" charset="0"/>
-                <a:cs typeface="Times New Roman" panose="02020603050405020304" pitchFamily="18" charset="0"/>
-              </a:rPr>
-              <a:t>[2].</a:t>
+                <a:latin typeface="Times" panose="02020603050405020304" pitchFamily="18" charset="0"/>
+                <a:cs typeface="Times" panose="02020603050405020304" pitchFamily="18" charset="0"/>
+              </a:rPr>
+              <a:t>O pacote de código aberto do XAMPP foi criado para ser extremamente fácil de instalar e de usar.</a:t>
             </a:r>
           </a:p>
           <a:p>
             <a:pPr marL="0" indent="0" algn="just">
               <a:buNone/>
-              <a:tabLst>
-                <a:tab pos="457200" algn="l"/>
-              </a:tabLst>
             </a:pPr>
-            <a:endParaRPr lang="pt-BR" sz="2000" dirty="0">
+            <a:endParaRPr lang="pt-BR" sz="2400" dirty="0">
               <a:solidFill>
                 <a:schemeClr val="tx1"/>
               </a:solidFill>
-              <a:latin typeface="Times New Roman" panose="02020603050405020304" pitchFamily="18" charset="0"/>
-              <a:cs typeface="Times New Roman" panose="02020603050405020304" pitchFamily="18" charset="0"/>
+              <a:latin typeface="Times" panose="02020603050405020304" pitchFamily="18" charset="0"/>
+              <a:cs typeface="Times" panose="02020603050405020304" pitchFamily="18" charset="0"/>
             </a:endParaRPr>
           </a:p>
           <a:p>
             <a:pPr marL="0" indent="0" algn="just">
               <a:buNone/>
-              <a:tabLst>
-                <a:tab pos="457200" algn="l"/>
-              </a:tabLst>
             </a:pPr>
             <a:r>
-              <a:rPr lang="pt-BR" sz="2000" dirty="0">
+              <a:rPr lang="pt-BR" sz="2400" dirty="0">
                 <a:solidFill>
                   <a:schemeClr val="tx1"/>
                 </a:solidFill>
-                <a:latin typeface="Times New Roman" panose="02020603050405020304" pitchFamily="18" charset="0"/>
-                <a:cs typeface="Times New Roman" panose="02020603050405020304" pitchFamily="18" charset="0"/>
-              </a:rPr>
-              <a:t>[3].</a:t>
-            </a:r>
-          </a:p>
-          <a:p>
-            <a:pPr marL="0" indent="0" algn="just">
-              <a:buNone/>
-              <a:tabLst>
-                <a:tab pos="457200" algn="l"/>
-              </a:tabLst>
-            </a:pPr>
-            <a:endParaRPr lang="pt-BR" sz="2000" dirty="0">
+                <a:latin typeface="Times" panose="02020603050405020304" pitchFamily="18" charset="0"/>
+                <a:cs typeface="Times" panose="02020603050405020304" pitchFamily="18" charset="0"/>
+              </a:rPr>
+              <a:t>	</a:t>
+            </a:r>
+            <a:r>
+              <a:rPr lang="pt-BR" sz="2400" dirty="0">
+                <a:solidFill>
+                  <a:schemeClr val="tx1"/>
+                </a:solidFill>
+                <a:latin typeface="Times" panose="02020603050405020304" pitchFamily="18" charset="0"/>
+                <a:cs typeface="Times" panose="02020603050405020304" pitchFamily="18" charset="0"/>
+                <a:hlinkClick r:id="rId3"/>
+              </a:rPr>
+              <a:t>https://www.apachefriends.org/pt_br/index.html</a:t>
+            </a:r>
+            <a:endParaRPr lang="pt-BR" sz="2400" dirty="0">
               <a:solidFill>
                 <a:schemeClr val="tx1"/>
               </a:solidFill>
-              <a:latin typeface="Times New Roman" panose="02020603050405020304" pitchFamily="18" charset="0"/>
-              <a:cs typeface="Times New Roman" panose="02020603050405020304" pitchFamily="18" charset="0"/>
+              <a:latin typeface="Times" panose="02020603050405020304" pitchFamily="18" charset="0"/>
+              <a:cs typeface="Times" panose="02020603050405020304" pitchFamily="18" charset="0"/>
+            </a:endParaRPr>
+          </a:p>
+          <a:p>
+            <a:pPr marL="0" indent="0" algn="just">
+              <a:buNone/>
+            </a:pPr>
+            <a:endParaRPr lang="pt-BR" sz="2400" dirty="0">
+              <a:solidFill>
+                <a:schemeClr val="tx1"/>
+              </a:solidFill>
+              <a:latin typeface="Times" panose="02020603050405020304" pitchFamily="18" charset="0"/>
+              <a:cs typeface="Times" panose="02020603050405020304" pitchFamily="18" charset="0"/>
+            </a:endParaRPr>
+          </a:p>
+          <a:p>
+            <a:pPr marL="0" indent="0" algn="just">
+              <a:buNone/>
+            </a:pPr>
+            <a:endParaRPr lang="pt-BR" sz="2400" dirty="0">
+              <a:solidFill>
+                <a:schemeClr val="tx1"/>
+              </a:solidFill>
+              <a:latin typeface="Times" panose="02020603050405020304" pitchFamily="18" charset="0"/>
+              <a:cs typeface="Times" panose="02020603050405020304" pitchFamily="18" charset="0"/>
+            </a:endParaRPr>
+          </a:p>
+          <a:p>
+            <a:pPr marL="0" indent="0" algn="just">
+              <a:buNone/>
+            </a:pPr>
+            <a:endParaRPr lang="pt-BR" sz="1800" b="1" dirty="0">
+              <a:solidFill>
+                <a:srgbClr val="FF0000"/>
+              </a:solidFill>
+              <a:latin typeface="Times" panose="02020603050405020304" pitchFamily="18" charset="0"/>
+              <a:cs typeface="Times" panose="02020603050405020304" pitchFamily="18" charset="0"/>
             </a:endParaRPr>
           </a:p>
         </p:txBody>
@@ -5256,7 +6847,7 @@
     </p:spTree>
     <p:extLst>
       <p:ext uri="{BB962C8B-B14F-4D97-AF65-F5344CB8AC3E}">
-        <p14:creationId xmlns:p14="http://schemas.microsoft.com/office/powerpoint/2010/main" val="1115311843"/>
+        <p14:creationId xmlns:p14="http://schemas.microsoft.com/office/powerpoint/2010/main" val="3181678423"/>
       </p:ext>
     </p:extLst>
   </p:cSld>
@@ -5284,67 +6875,9 @@
           <a:chExt cx="0" cy="0"/>
         </a:xfrm>
       </p:grpSpPr>
-      <p:pic>
-        <p:nvPicPr>
-          <p:cNvPr id="112" name="Picture 6" descr="Picture 6"/>
-          <p:cNvPicPr>
-            <a:picLocks noChangeAspect="1"/>
-          </p:cNvPicPr>
-          <p:nvPr/>
-        </p:nvPicPr>
-        <p:blipFill>
-          <a:blip r:embed="rId2"/>
-          <a:stretch>
-            <a:fillRect/>
-          </a:stretch>
-        </p:blipFill>
-        <p:spPr>
-          <a:xfrm>
-            <a:off x="0" y="0"/>
-            <a:ext cx="9144000" cy="5143500"/>
-          </a:xfrm>
-          <a:prstGeom prst="rect">
-            <a:avLst/>
-          </a:prstGeom>
-          <a:ln w="12700">
-            <a:miter lim="400000"/>
-            <a:headEnd/>
-            <a:tailEnd/>
-          </a:ln>
-        </p:spPr>
-      </p:pic>
-      <p:pic>
-        <p:nvPicPr>
-          <p:cNvPr id="114" name="Picture 5" descr="Picture 5"/>
-          <p:cNvPicPr>
-            <a:picLocks noChangeAspect="1"/>
-          </p:cNvPicPr>
-          <p:nvPr/>
-        </p:nvPicPr>
-        <p:blipFill>
-          <a:blip r:embed="rId3"/>
-          <a:stretch>
-            <a:fillRect/>
-          </a:stretch>
-        </p:blipFill>
-        <p:spPr>
-          <a:xfrm>
-            <a:off x="469900" y="0"/>
-            <a:ext cx="4391984" cy="171450"/>
-          </a:xfrm>
-          <a:prstGeom prst="rect">
-            <a:avLst/>
-          </a:prstGeom>
-          <a:ln w="12700">
-            <a:miter lim="400000"/>
-            <a:headEnd/>
-            <a:tailEnd/>
-          </a:ln>
-        </p:spPr>
-      </p:pic>
       <p:sp>
         <p:nvSpPr>
-          <p:cNvPr id="3" name="Título 2"/>
+          <p:cNvPr id="6" name="Title 1"/>
           <p:cNvSpPr>
             <a:spLocks noGrp="1"/>
           </p:cNvSpPr>
@@ -5354,8 +6887,62 @@
         </p:nvSpPr>
         <p:spPr>
           <a:xfrm>
-            <a:off x="285751" y="2386770"/>
-            <a:ext cx="8615364" cy="1102519"/>
+            <a:off x="457200" y="205980"/>
+            <a:ext cx="8229600" cy="857251"/>
+          </a:xfrm>
+        </p:spPr>
+        <p:txBody>
+          <a:bodyPr>
+            <a:normAutofit/>
+          </a:bodyPr>
+          <a:lstStyle/>
+          <a:p>
+            <a:r>
+              <a:rPr lang="en-US" b="1" dirty="0" err="1">
+                <a:solidFill>
+                  <a:srgbClr val="0070C0"/>
+                </a:solidFill>
+              </a:rPr>
+              <a:t>Leitura</a:t>
+            </a:r>
+            <a:r>
+              <a:rPr lang="en-US" b="1" dirty="0">
+                <a:solidFill>
+                  <a:srgbClr val="0070C0"/>
+                </a:solidFill>
+              </a:rPr>
+              <a:t> </a:t>
+            </a:r>
+            <a:r>
+              <a:rPr lang="en-US" b="1" dirty="0" err="1">
+                <a:solidFill>
+                  <a:srgbClr val="0070C0"/>
+                </a:solidFill>
+              </a:rPr>
+              <a:t>Específica</a:t>
+            </a:r>
+            <a:endParaRPr lang="en-US" b="1" dirty="0">
+              <a:solidFill>
+                <a:srgbClr val="0070C0"/>
+              </a:solidFill>
+            </a:endParaRPr>
+          </a:p>
+        </p:txBody>
+      </p:sp>
+      <p:sp>
+        <p:nvSpPr>
+          <p:cNvPr id="8" name="Text Placeholder 2"/>
+          <p:cNvSpPr>
+            <a:spLocks noGrp="1"/>
+          </p:cNvSpPr>
+          <p:nvPr>
+            <p:ph type="body" sz="half" idx="1"/>
+          </p:nvPr>
+        </p:nvSpPr>
+        <p:spPr>
+          <a:xfrm>
+            <a:off x="142865" y="1200151"/>
+            <a:ext cx="8865056" cy="3394472"/>
           </a:xfrm>
         </p:spPr>
         <p:txBody>
@@ -5364,371 +6951,305 @@
           </a:bodyPr>
           <a:lstStyle/>
           <a:p>
-            <a:r>
-              <a:rPr lang="pt-BR" sz="4800" b="1" dirty="0">
-                <a:solidFill>
-                  <a:schemeClr val="bg1"/>
-                </a:solidFill>
-              </a:rPr>
-              <a:t>Cloud Computer e </a:t>
-            </a:r>
-            <a:br>
-              <a:rPr lang="pt-BR" sz="4800" b="1" dirty="0">
-                <a:solidFill>
-                  <a:schemeClr val="bg1"/>
-                </a:solidFill>
-              </a:rPr>
-            </a:br>
-            <a:r>
-              <a:rPr lang="pt-BR" sz="4800" b="1" dirty="0">
-                <a:solidFill>
-                  <a:schemeClr val="bg1"/>
-                </a:solidFill>
-              </a:rPr>
-              <a:t>Web Services em Linux</a:t>
+            <a:pPr marL="0" indent="0" algn="just">
+              <a:buNone/>
+            </a:pPr>
+            <a:r>
+              <a:rPr lang="pt-BR" sz="2000" dirty="0">
+                <a:latin typeface="Times New Roman" panose="02020603050405020304" pitchFamily="18" charset="0"/>
+                <a:cs typeface="Times New Roman" panose="02020603050405020304" pitchFamily="18" charset="0"/>
+              </a:rPr>
+              <a:t>[1] Site Oficial APACHE</a:t>
+            </a:r>
+          </a:p>
+          <a:p>
+            <a:pPr marL="0" indent="0" algn="just">
+              <a:buNone/>
+            </a:pPr>
+            <a:r>
+              <a:rPr lang="pt-BR" sz="2000" b="1" dirty="0">
+                <a:solidFill>
+                  <a:srgbClr val="FF0000"/>
+                </a:solidFill>
+                <a:latin typeface="Times New Roman" panose="02020603050405020304" pitchFamily="18" charset="0"/>
+                <a:cs typeface="Times New Roman" panose="02020603050405020304" pitchFamily="18" charset="0"/>
+              </a:rPr>
+              <a:t>Disponível em: </a:t>
+            </a:r>
+            <a:r>
+              <a:rPr lang="pt-BR" sz="2000" dirty="0">
+                <a:solidFill>
+                  <a:srgbClr val="FF0000"/>
+                </a:solidFill>
+                <a:latin typeface="Times New Roman" panose="02020603050405020304" pitchFamily="18" charset="0"/>
+                <a:cs typeface="Times New Roman" panose="02020603050405020304" pitchFamily="18" charset="0"/>
+                <a:hlinkClick r:id="rId3"/>
+              </a:rPr>
+              <a:t>https://httpd.apache.org/</a:t>
+            </a:r>
+            <a:endParaRPr lang="pt-BR" sz="2000" dirty="0">
+              <a:solidFill>
+                <a:srgbClr val="FF0000"/>
+              </a:solidFill>
+              <a:latin typeface="Times New Roman" panose="02020603050405020304" pitchFamily="18" charset="0"/>
+              <a:cs typeface="Times New Roman" panose="02020603050405020304" pitchFamily="18" charset="0"/>
+            </a:endParaRPr>
+          </a:p>
+          <a:p>
+            <a:pPr marL="0" indent="0" algn="just">
+              <a:buNone/>
+            </a:pPr>
+            <a:endParaRPr lang="pt-BR" sz="2000" dirty="0">
+              <a:latin typeface="Times New Roman" panose="02020603050405020304" pitchFamily="18" charset="0"/>
+              <a:cs typeface="Times New Roman" panose="02020603050405020304" pitchFamily="18" charset="0"/>
+            </a:endParaRPr>
+          </a:p>
+          <a:p>
+            <a:pPr marL="0" indent="0" algn="just">
+              <a:buNone/>
+            </a:pPr>
+            <a:endParaRPr lang="pt-BR" sz="2000" dirty="0">
+              <a:latin typeface="Times New Roman" panose="02020603050405020304" pitchFamily="18" charset="0"/>
+              <a:cs typeface="Times New Roman" panose="02020603050405020304" pitchFamily="18" charset="0"/>
+            </a:endParaRPr>
+          </a:p>
+          <a:p>
+            <a:pPr marL="0" indent="0" algn="just">
+              <a:buNone/>
+            </a:pPr>
+            <a:r>
+              <a:rPr lang="pt-BR" sz="2000" dirty="0">
+                <a:latin typeface="Times New Roman" panose="02020603050405020304" pitchFamily="18" charset="0"/>
+                <a:cs typeface="Times New Roman" panose="02020603050405020304" pitchFamily="18" charset="0"/>
+              </a:rPr>
+              <a:t>[2] Conhecendo o Servidor Apache (HTTP Server Project)</a:t>
+            </a:r>
+          </a:p>
+          <a:p>
+            <a:pPr marL="0" indent="0" algn="just">
+              <a:buNone/>
+            </a:pPr>
+            <a:r>
+              <a:rPr lang="pt-BR" sz="2000" b="1" dirty="0">
+                <a:solidFill>
+                  <a:srgbClr val="FF0000"/>
+                </a:solidFill>
+                <a:latin typeface="Times New Roman" panose="02020603050405020304" pitchFamily="18" charset="0"/>
+                <a:cs typeface="Times New Roman" panose="02020603050405020304" pitchFamily="18" charset="0"/>
+              </a:rPr>
+              <a:t>Disponível em: </a:t>
+            </a:r>
+            <a:r>
+              <a:rPr lang="pt-BR" sz="2000" dirty="0">
+                <a:latin typeface="Times New Roman" panose="02020603050405020304" pitchFamily="18" charset="0"/>
+                <a:cs typeface="Times New Roman" panose="02020603050405020304" pitchFamily="18" charset="0"/>
+                <a:hlinkClick r:id="rId4"/>
+              </a:rPr>
+              <a:t>https://www.infowester.com/servapach.php</a:t>
+            </a:r>
+            <a:endParaRPr lang="pt-BR" sz="2000" dirty="0">
+              <a:latin typeface="Calibri" panose="020F0502020204030204" pitchFamily="34" charset="0"/>
+            </a:endParaRPr>
+          </a:p>
+        </p:txBody>
+      </p:sp>
+    </p:spTree>
+    <p:extLst>
+      <p:ext uri="{BB962C8B-B14F-4D97-AF65-F5344CB8AC3E}">
+        <p14:creationId xmlns:p14="http://schemas.microsoft.com/office/powerpoint/2010/main" val="4175167667"/>
+      </p:ext>
+    </p:extLst>
+  </p:cSld>
+  <p:clrMapOvr>
+    <a:masterClrMapping/>
+  </p:clrMapOvr>
+  <p:transition spd="med"/>
+</p:sld>
+</file>
+
+<file path=ppt/slides/slide9.xml><?xml version="1.0" encoding="utf-8"?>
+<p:sld xmlns:a="http://schemas.openxmlformats.org/drawingml/2006/main" xmlns:r="http://schemas.openxmlformats.org/officeDocument/2006/relationships" xmlns:p="http://schemas.openxmlformats.org/presentationml/2006/main">
+  <p:cSld>
+    <p:spTree>
+      <p:nvGrpSpPr>
+        <p:cNvPr id="1" name=""/>
+        <p:cNvGrpSpPr/>
+        <p:nvPr/>
+      </p:nvGrpSpPr>
+      <p:grpSpPr>
+        <a:xfrm>
+          <a:off x="0" y="0"/>
+          <a:ext cx="0" cy="0"/>
+          <a:chOff x="0" y="0"/>
+          <a:chExt cx="0" cy="0"/>
+        </a:xfrm>
+      </p:grpSpPr>
+      <p:sp>
+        <p:nvSpPr>
+          <p:cNvPr id="6" name="Title 1"/>
+          <p:cNvSpPr>
+            <a:spLocks noGrp="1"/>
+          </p:cNvSpPr>
+          <p:nvPr>
+            <p:ph type="title"/>
+          </p:nvPr>
+        </p:nvSpPr>
+        <p:spPr>
+          <a:xfrm>
+            <a:off x="457200" y="205980"/>
+            <a:ext cx="8229600" cy="857251"/>
+          </a:xfrm>
+        </p:spPr>
+        <p:txBody>
+          <a:bodyPr>
+            <a:normAutofit/>
+          </a:bodyPr>
+          <a:lstStyle/>
+          <a:p>
+            <a:r>
+              <a:rPr lang="en-US" b="1" dirty="0" err="1">
+                <a:solidFill>
+                  <a:srgbClr val="0070C0"/>
+                </a:solidFill>
+              </a:rPr>
+              <a:t>Aprenda</a:t>
+            </a:r>
+            <a:r>
+              <a:rPr lang="en-US" b="1" dirty="0">
+                <a:solidFill>
+                  <a:srgbClr val="0070C0"/>
+                </a:solidFill>
+              </a:rPr>
+              <a:t>+</a:t>
             </a:r>
           </a:p>
         </p:txBody>
       </p:sp>
       <p:sp>
         <p:nvSpPr>
-          <p:cNvPr id="6" name="Título 2"/>
-          <p:cNvSpPr txBox="1"/>
-          <p:nvPr/>
+          <p:cNvPr id="8" name="Text Placeholder 2"/>
+          <p:cNvSpPr>
+            <a:spLocks noGrp="1"/>
+          </p:cNvSpPr>
+          <p:nvPr>
+            <p:ph type="body" sz="half" idx="1"/>
+          </p:nvPr>
         </p:nvSpPr>
         <p:spPr>
           <a:xfrm>
-            <a:off x="975683" y="3866663"/>
-            <a:ext cx="7772400" cy="1102519"/>
+            <a:off x="142865" y="1200150"/>
+            <a:ext cx="8865056" cy="3737370"/>
           </a:xfrm>
-          <a:prstGeom prst="rect">
-            <a:avLst/>
-          </a:prstGeom>
-          <a:ln w="12700">
-            <a:miter lim="400000"/>
-          </a:ln>
         </p:spPr>
         <p:txBody>
-          <a:bodyPr lIns="45718" tIns="45718" rIns="45718" bIns="45718" anchor="ctr">
+          <a:bodyPr>
             <a:noAutofit/>
           </a:bodyPr>
-          <a:lstStyle>
-            <a:lvl1pPr marL="0" marR="0" indent="0" algn="ctr" defTabSz="457200" rtl="0" latinLnBrk="0">
-              <a:lnSpc>
-                <a:spcPct val="100000"/>
-              </a:lnSpc>
-              <a:spcBef>
-                <a:spcPts val="0"/>
-              </a:spcBef>
-              <a:spcAft>
-                <a:spcPts val="0"/>
-              </a:spcAft>
-              <a:buClrTx/>
-              <a:buSzTx/>
-              <a:buFontTx/>
+          <a:lstStyle/>
+          <a:p>
+            <a:pPr marL="0" indent="0" algn="just">
               <a:buNone/>
-              <a:defRPr sz="4400" b="0" i="0" u="none" strike="noStrike" cap="none" spc="0" baseline="0">
-                <a:ln>
-                  <a:noFill/>
-                </a:ln>
-                <a:solidFill>
-                  <a:srgbClr val="000000"/>
-                </a:solidFill>
-                <a:uFillTx/>
-                <a:latin typeface="+mj-lt"/>
-                <a:ea typeface="+mj-ea"/>
-                <a:cs typeface="+mj-cs"/>
-                <a:sym typeface="Calibri"/>
-              </a:defRPr>
-            </a:lvl1pPr>
-            <a:lvl2pPr marL="0" marR="0" indent="0" algn="ctr" defTabSz="457200" rtl="0" latinLnBrk="0">
-              <a:lnSpc>
-                <a:spcPct val="100000"/>
-              </a:lnSpc>
-              <a:spcBef>
-                <a:spcPts val="0"/>
-              </a:spcBef>
-              <a:spcAft>
-                <a:spcPts val="0"/>
-              </a:spcAft>
-              <a:buClrTx/>
-              <a:buSzTx/>
-              <a:buFontTx/>
+            </a:pPr>
+            <a:r>
+              <a:rPr lang="pt-BR" sz="2400" dirty="0">
+                <a:latin typeface="Times New Roman" panose="02020603050405020304" pitchFamily="18" charset="0"/>
+                <a:cs typeface="Times New Roman" panose="02020603050405020304" pitchFamily="18" charset="0"/>
+              </a:rPr>
+              <a:t>[1] O que é o Servidor Apache? Como funciona ... </a:t>
+            </a:r>
+          </a:p>
+          <a:p>
+            <a:pPr marL="0" indent="0" algn="just">
               <a:buNone/>
-              <a:defRPr sz="4400" b="0" i="0" u="none" strike="noStrike" cap="none" spc="0" baseline="0">
-                <a:ln>
-                  <a:noFill/>
-                </a:ln>
-                <a:solidFill>
-                  <a:srgbClr val="000000"/>
-                </a:solidFill>
-                <a:uFillTx/>
-                <a:latin typeface="+mj-lt"/>
-                <a:ea typeface="+mj-ea"/>
-                <a:cs typeface="+mj-cs"/>
-                <a:sym typeface="Calibri"/>
-              </a:defRPr>
-            </a:lvl2pPr>
-            <a:lvl3pPr marL="0" marR="0" indent="0" algn="ctr" defTabSz="457200" rtl="0" latinLnBrk="0">
-              <a:lnSpc>
-                <a:spcPct val="100000"/>
-              </a:lnSpc>
-              <a:spcBef>
-                <a:spcPts val="0"/>
-              </a:spcBef>
-              <a:spcAft>
-                <a:spcPts val="0"/>
-              </a:spcAft>
-              <a:buClrTx/>
-              <a:buSzTx/>
-              <a:buFontTx/>
+            </a:pPr>
+            <a:r>
+              <a:rPr lang="pt-BR" sz="2400" b="1" dirty="0">
+                <a:solidFill>
+                  <a:srgbClr val="FF0000"/>
+                </a:solidFill>
+                <a:latin typeface="Times New Roman" panose="02020603050405020304" pitchFamily="18" charset="0"/>
+                <a:cs typeface="Times New Roman" panose="02020603050405020304" pitchFamily="18" charset="0"/>
+              </a:rPr>
+              <a:t>Disponível em: </a:t>
+            </a:r>
+            <a:r>
+              <a:rPr lang="pt-BR" sz="2400" dirty="0">
+                <a:latin typeface="Times New Roman" panose="02020603050405020304" pitchFamily="18" charset="0"/>
+                <a:cs typeface="Times New Roman" panose="02020603050405020304" pitchFamily="18" charset="0"/>
+                <a:hlinkClick r:id="rId3"/>
+              </a:rPr>
+              <a:t>https://youtu.be/dtsl-bpovAY</a:t>
+            </a:r>
+            <a:endParaRPr lang="pt-BR" sz="2400" dirty="0">
+              <a:latin typeface="Times New Roman" panose="02020603050405020304" pitchFamily="18" charset="0"/>
+              <a:cs typeface="Times New Roman" panose="02020603050405020304" pitchFamily="18" charset="0"/>
+            </a:endParaRPr>
+          </a:p>
+          <a:p>
+            <a:pPr marL="0" indent="0" algn="just">
               <a:buNone/>
-              <a:defRPr sz="4400" b="0" i="0" u="none" strike="noStrike" cap="none" spc="0" baseline="0">
-                <a:ln>
-                  <a:noFill/>
-                </a:ln>
-                <a:solidFill>
-                  <a:srgbClr val="000000"/>
-                </a:solidFill>
-                <a:uFillTx/>
-                <a:latin typeface="+mj-lt"/>
-                <a:ea typeface="+mj-ea"/>
-                <a:cs typeface="+mj-cs"/>
-                <a:sym typeface="Calibri"/>
-              </a:defRPr>
-            </a:lvl3pPr>
-            <a:lvl4pPr marL="0" marR="0" indent="0" algn="ctr" defTabSz="457200" rtl="0" latinLnBrk="0">
-              <a:lnSpc>
-                <a:spcPct val="100000"/>
-              </a:lnSpc>
-              <a:spcBef>
-                <a:spcPts val="0"/>
-              </a:spcBef>
-              <a:spcAft>
-                <a:spcPts val="0"/>
-              </a:spcAft>
-              <a:buClrTx/>
-              <a:buSzTx/>
-              <a:buFontTx/>
+            </a:pPr>
+            <a:endParaRPr lang="pt-BR" sz="2400" dirty="0">
+              <a:latin typeface="Times New Roman" panose="02020603050405020304" pitchFamily="18" charset="0"/>
+              <a:cs typeface="Times New Roman" panose="02020603050405020304" pitchFamily="18" charset="0"/>
+            </a:endParaRPr>
+          </a:p>
+          <a:p>
+            <a:pPr marL="0" indent="0" algn="just">
               <a:buNone/>
-              <a:defRPr sz="4400" b="0" i="0" u="none" strike="noStrike" cap="none" spc="0" baseline="0">
-                <a:ln>
-                  <a:noFill/>
-                </a:ln>
-                <a:solidFill>
-                  <a:srgbClr val="000000"/>
-                </a:solidFill>
-                <a:uFillTx/>
-                <a:latin typeface="+mj-lt"/>
-                <a:ea typeface="+mj-ea"/>
-                <a:cs typeface="+mj-cs"/>
-                <a:sym typeface="Calibri"/>
-              </a:defRPr>
-            </a:lvl4pPr>
-            <a:lvl5pPr marL="0" marR="0" indent="0" algn="ctr" defTabSz="457200" rtl="0" latinLnBrk="0">
-              <a:lnSpc>
-                <a:spcPct val="100000"/>
-              </a:lnSpc>
-              <a:spcBef>
-                <a:spcPts val="0"/>
-              </a:spcBef>
-              <a:spcAft>
-                <a:spcPts val="0"/>
-              </a:spcAft>
-              <a:buClrTx/>
-              <a:buSzTx/>
-              <a:buFontTx/>
+            </a:pPr>
+            <a:endParaRPr lang="pt-BR" sz="2400" dirty="0">
+              <a:latin typeface="Times New Roman" panose="02020603050405020304" pitchFamily="18" charset="0"/>
+              <a:cs typeface="Times New Roman" panose="02020603050405020304" pitchFamily="18" charset="0"/>
+            </a:endParaRPr>
+          </a:p>
+          <a:p>
+            <a:pPr marL="0" indent="0" algn="just">
               <a:buNone/>
-              <a:defRPr sz="4400" b="0" i="0" u="none" strike="noStrike" cap="none" spc="0" baseline="0">
-                <a:ln>
-                  <a:noFill/>
-                </a:ln>
-                <a:solidFill>
-                  <a:srgbClr val="000000"/>
-                </a:solidFill>
-                <a:uFillTx/>
-                <a:latin typeface="+mj-lt"/>
-                <a:ea typeface="+mj-ea"/>
-                <a:cs typeface="+mj-cs"/>
-                <a:sym typeface="Calibri"/>
-              </a:defRPr>
-            </a:lvl5pPr>
-            <a:lvl6pPr marL="0" marR="0" indent="0" algn="ctr" defTabSz="457200" rtl="0" latinLnBrk="0">
-              <a:lnSpc>
-                <a:spcPct val="100000"/>
-              </a:lnSpc>
-              <a:spcBef>
-                <a:spcPts val="0"/>
-              </a:spcBef>
-              <a:spcAft>
-                <a:spcPts val="0"/>
-              </a:spcAft>
-              <a:buClrTx/>
-              <a:buSzTx/>
-              <a:buFontTx/>
+            </a:pPr>
+            <a:r>
+              <a:rPr lang="pt-BR" sz="2400" dirty="0">
+                <a:latin typeface="Times New Roman" panose="02020603050405020304" pitchFamily="18" charset="0"/>
+                <a:cs typeface="Times New Roman" panose="02020603050405020304" pitchFamily="18" charset="0"/>
+              </a:rPr>
+              <a:t>[2] Problemas, bugs e defeitos do XAMPP</a:t>
+            </a:r>
+          </a:p>
+          <a:p>
+            <a:pPr marL="0" indent="0" algn="just">
               <a:buNone/>
-              <a:defRPr sz="4400" b="0" i="0" u="none" strike="noStrike" cap="none" spc="0" baseline="0">
-                <a:ln>
-                  <a:noFill/>
-                </a:ln>
-                <a:solidFill>
-                  <a:srgbClr val="000000"/>
-                </a:solidFill>
-                <a:uFillTx/>
-                <a:latin typeface="+mj-lt"/>
-                <a:ea typeface="+mj-ea"/>
-                <a:cs typeface="+mj-cs"/>
-                <a:sym typeface="Calibri"/>
-              </a:defRPr>
-            </a:lvl6pPr>
-            <a:lvl7pPr marL="0" marR="0" indent="0" algn="ctr" defTabSz="457200" rtl="0" latinLnBrk="0">
-              <a:lnSpc>
-                <a:spcPct val="100000"/>
-              </a:lnSpc>
-              <a:spcBef>
-                <a:spcPts val="0"/>
-              </a:spcBef>
-              <a:spcAft>
-                <a:spcPts val="0"/>
-              </a:spcAft>
-              <a:buClrTx/>
-              <a:buSzTx/>
-              <a:buFontTx/>
-              <a:buNone/>
-              <a:defRPr sz="4400" b="0" i="0" u="none" strike="noStrike" cap="none" spc="0" baseline="0">
-                <a:ln>
-                  <a:noFill/>
-                </a:ln>
-                <a:solidFill>
-                  <a:srgbClr val="000000"/>
-                </a:solidFill>
-                <a:uFillTx/>
-                <a:latin typeface="+mj-lt"/>
-                <a:ea typeface="+mj-ea"/>
-                <a:cs typeface="+mj-cs"/>
-                <a:sym typeface="Calibri"/>
-              </a:defRPr>
-            </a:lvl7pPr>
-            <a:lvl8pPr marL="0" marR="0" indent="0" algn="ctr" defTabSz="457200" rtl="0" latinLnBrk="0">
-              <a:lnSpc>
-                <a:spcPct val="100000"/>
-              </a:lnSpc>
-              <a:spcBef>
-                <a:spcPts val="0"/>
-              </a:spcBef>
-              <a:spcAft>
-                <a:spcPts val="0"/>
-              </a:spcAft>
-              <a:buClrTx/>
-              <a:buSzTx/>
-              <a:buFontTx/>
-              <a:buNone/>
-              <a:defRPr sz="4400" b="0" i="0" u="none" strike="noStrike" cap="none" spc="0" baseline="0">
-                <a:ln>
-                  <a:noFill/>
-                </a:ln>
-                <a:solidFill>
-                  <a:srgbClr val="000000"/>
-                </a:solidFill>
-                <a:uFillTx/>
-                <a:latin typeface="+mj-lt"/>
-                <a:ea typeface="+mj-ea"/>
-                <a:cs typeface="+mj-cs"/>
-                <a:sym typeface="Calibri"/>
-              </a:defRPr>
-            </a:lvl8pPr>
-            <a:lvl9pPr marL="0" marR="0" indent="0" algn="ctr" defTabSz="457200" rtl="0" latinLnBrk="0">
-              <a:lnSpc>
-                <a:spcPct val="100000"/>
-              </a:lnSpc>
-              <a:spcBef>
-                <a:spcPts val="0"/>
-              </a:spcBef>
-              <a:spcAft>
-                <a:spcPts val="0"/>
-              </a:spcAft>
-              <a:buClrTx/>
-              <a:buSzTx/>
-              <a:buFontTx/>
-              <a:buNone/>
-              <a:defRPr sz="4400" b="0" i="0" u="none" strike="noStrike" cap="none" spc="0" baseline="0">
-                <a:ln>
-                  <a:noFill/>
-                </a:ln>
-                <a:solidFill>
-                  <a:srgbClr val="000000"/>
-                </a:solidFill>
-                <a:uFillTx/>
-                <a:latin typeface="+mj-lt"/>
-                <a:ea typeface="+mj-ea"/>
-                <a:cs typeface="+mj-cs"/>
-                <a:sym typeface="Calibri"/>
-              </a:defRPr>
-            </a:lvl9pPr>
-          </a:lstStyle>
-          <a:p>
-            <a:pPr algn="r" hangingPunct="1"/>
-            <a:r>
-              <a:rPr lang="pt-BR" sz="2000" b="1" dirty="0">
-                <a:solidFill>
-                  <a:schemeClr val="bg1"/>
-                </a:solidFill>
-              </a:rPr>
-              <a:t>Professor </a:t>
-            </a:r>
-            <a:r>
-              <a:rPr lang="pt-BR" sz="2000" b="1">
-                <a:solidFill>
-                  <a:schemeClr val="bg1"/>
-                </a:solidFill>
-              </a:rPr>
-              <a:t>M.Sc</a:t>
-            </a:r>
-            <a:r>
-              <a:rPr lang="pt-BR" sz="2000" b="1" dirty="0">
-                <a:solidFill>
-                  <a:schemeClr val="bg1"/>
-                </a:solidFill>
-              </a:rPr>
-              <a:t>. Heleno Cardoso</a:t>
-            </a:r>
+            </a:pPr>
+            <a:r>
+              <a:rPr lang="pt-BR" sz="2400" b="1" dirty="0">
+                <a:solidFill>
+                  <a:srgbClr val="FF0000"/>
+                </a:solidFill>
+                <a:latin typeface="Times New Roman" panose="02020603050405020304" pitchFamily="18" charset="0"/>
+                <a:cs typeface="Times New Roman" panose="02020603050405020304" pitchFamily="18" charset="0"/>
+              </a:rPr>
+              <a:t>Disponível em: </a:t>
+            </a:r>
+            <a:r>
+              <a:rPr lang="pt-BR" sz="2400" dirty="0">
+                <a:latin typeface="Times New Roman" panose="02020603050405020304" pitchFamily="18" charset="0"/>
+                <a:cs typeface="Times New Roman" panose="02020603050405020304" pitchFamily="18" charset="0"/>
+                <a:hlinkClick r:id="rId4"/>
+              </a:rPr>
+              <a:t>https://youtu.be/OFip2LlKtGY</a:t>
+            </a:r>
+            <a:endParaRPr lang="pt-BR" sz="2400" dirty="0">
+              <a:latin typeface="Times New Roman" panose="02020603050405020304" pitchFamily="18" charset="0"/>
+              <a:cs typeface="Times New Roman" panose="02020603050405020304" pitchFamily="18" charset="0"/>
+            </a:endParaRPr>
           </a:p>
         </p:txBody>
       </p:sp>
-      <p:pic>
-        <p:nvPicPr>
-          <p:cNvPr id="2" name="Google Shape;62;p1" descr="Imagem">
-            <a:extLst>
-              <a:ext uri="{FF2B5EF4-FFF2-40B4-BE49-F238E27FC236}">
-                <a16:creationId xmlns:a16="http://schemas.microsoft.com/office/drawing/2014/main" id="{9C895622-2963-024D-634E-EA58F5381D06}"/>
-              </a:ext>
-            </a:extLst>
-          </p:cNvPr>
-          <p:cNvPicPr preferRelativeResize="0"/>
-          <p:nvPr/>
-        </p:nvPicPr>
-        <p:blipFill rotWithShape="1">
-          <a:blip r:embed="rId4">
-            <a:alphaModFix/>
-          </a:blip>
-          <a:srcRect/>
-          <a:stretch/>
-        </p:blipFill>
-        <p:spPr>
-          <a:xfrm>
-            <a:off x="469898" y="343798"/>
-            <a:ext cx="2858518" cy="1338697"/>
-          </a:xfrm>
-          <a:prstGeom prst="rect">
-            <a:avLst/>
-          </a:prstGeom>
-          <a:noFill/>
-          <a:ln>
-            <a:noFill/>
-          </a:ln>
-        </p:spPr>
-      </p:pic>
     </p:spTree>
+    <p:extLst>
+      <p:ext uri="{BB962C8B-B14F-4D97-AF65-F5344CB8AC3E}">
+        <p14:creationId xmlns:p14="http://schemas.microsoft.com/office/powerpoint/2010/main" val="2747596967"/>
+      </p:ext>
+    </p:extLst>
   </p:cSld>
   <p:clrMapOvr>
     <a:masterClrMapping/>

</xml_diff>